<commit_message>
use json body instead of query params
</commit_message>
<xml_diff>
--- a/Architektur.pptx
+++ b/Architektur.pptx
@@ -262,7 +262,7 @@
           <a:p>
             <a:fld id="{66EF7BA3-99A7-BB4E-8AD5-910021624372}" type="datetimeFigureOut">
               <a:rPr lang="de-DE" smtClean="0"/>
-              <a:t>01.03.22</a:t>
+              <a:t>14.03.22</a:t>
             </a:fld>
             <a:endParaRPr lang="de-DE"/>
           </a:p>
@@ -460,7 +460,7 @@
           <a:p>
             <a:fld id="{66EF7BA3-99A7-BB4E-8AD5-910021624372}" type="datetimeFigureOut">
               <a:rPr lang="de-DE" smtClean="0"/>
-              <a:t>01.03.22</a:t>
+              <a:t>14.03.22</a:t>
             </a:fld>
             <a:endParaRPr lang="de-DE"/>
           </a:p>
@@ -668,7 +668,7 @@
           <a:p>
             <a:fld id="{66EF7BA3-99A7-BB4E-8AD5-910021624372}" type="datetimeFigureOut">
               <a:rPr lang="de-DE" smtClean="0"/>
-              <a:t>01.03.22</a:t>
+              <a:t>14.03.22</a:t>
             </a:fld>
             <a:endParaRPr lang="de-DE"/>
           </a:p>
@@ -866,7 +866,7 @@
           <a:p>
             <a:fld id="{66EF7BA3-99A7-BB4E-8AD5-910021624372}" type="datetimeFigureOut">
               <a:rPr lang="de-DE" smtClean="0"/>
-              <a:t>01.03.22</a:t>
+              <a:t>14.03.22</a:t>
             </a:fld>
             <a:endParaRPr lang="de-DE"/>
           </a:p>
@@ -1141,7 +1141,7 @@
           <a:p>
             <a:fld id="{66EF7BA3-99A7-BB4E-8AD5-910021624372}" type="datetimeFigureOut">
               <a:rPr lang="de-DE" smtClean="0"/>
-              <a:t>01.03.22</a:t>
+              <a:t>14.03.22</a:t>
             </a:fld>
             <a:endParaRPr lang="de-DE"/>
           </a:p>
@@ -1406,7 +1406,7 @@
           <a:p>
             <a:fld id="{66EF7BA3-99A7-BB4E-8AD5-910021624372}" type="datetimeFigureOut">
               <a:rPr lang="de-DE" smtClean="0"/>
-              <a:t>01.03.22</a:t>
+              <a:t>14.03.22</a:t>
             </a:fld>
             <a:endParaRPr lang="de-DE"/>
           </a:p>
@@ -1818,7 +1818,7 @@
           <a:p>
             <a:fld id="{66EF7BA3-99A7-BB4E-8AD5-910021624372}" type="datetimeFigureOut">
               <a:rPr lang="de-DE" smtClean="0"/>
-              <a:t>01.03.22</a:t>
+              <a:t>14.03.22</a:t>
             </a:fld>
             <a:endParaRPr lang="de-DE"/>
           </a:p>
@@ -1959,7 +1959,7 @@
           <a:p>
             <a:fld id="{66EF7BA3-99A7-BB4E-8AD5-910021624372}" type="datetimeFigureOut">
               <a:rPr lang="de-DE" smtClean="0"/>
-              <a:t>01.03.22</a:t>
+              <a:t>14.03.22</a:t>
             </a:fld>
             <a:endParaRPr lang="de-DE"/>
           </a:p>
@@ -2072,7 +2072,7 @@
           <a:p>
             <a:fld id="{66EF7BA3-99A7-BB4E-8AD5-910021624372}" type="datetimeFigureOut">
               <a:rPr lang="de-DE" smtClean="0"/>
-              <a:t>01.03.22</a:t>
+              <a:t>14.03.22</a:t>
             </a:fld>
             <a:endParaRPr lang="de-DE"/>
           </a:p>
@@ -2383,7 +2383,7 @@
           <a:p>
             <a:fld id="{66EF7BA3-99A7-BB4E-8AD5-910021624372}" type="datetimeFigureOut">
               <a:rPr lang="de-DE" smtClean="0"/>
-              <a:t>01.03.22</a:t>
+              <a:t>14.03.22</a:t>
             </a:fld>
             <a:endParaRPr lang="de-DE"/>
           </a:p>
@@ -2671,7 +2671,7 @@
           <a:p>
             <a:fld id="{66EF7BA3-99A7-BB4E-8AD5-910021624372}" type="datetimeFigureOut">
               <a:rPr lang="de-DE" smtClean="0"/>
-              <a:t>01.03.22</a:t>
+              <a:t>14.03.22</a:t>
             </a:fld>
             <a:endParaRPr lang="de-DE"/>
           </a:p>
@@ -2912,7 +2912,7 @@
           <a:p>
             <a:fld id="{66EF7BA3-99A7-BB4E-8AD5-910021624372}" type="datetimeFigureOut">
               <a:rPr lang="de-DE" smtClean="0"/>
-              <a:t>01.03.22</a:t>
+              <a:t>14.03.22</a:t>
             </a:fld>
             <a:endParaRPr lang="de-DE"/>
           </a:p>
@@ -5660,9 +5660,10 @@
               <a:rPr lang="de-DE" dirty="0"/>
             </a:br>
             <a:r>
-              <a:rPr lang="de-DE" dirty="0"/>
-              <a:t>Shop</a:t>
-            </a:r>
+              <a:rPr lang="de-DE" dirty="0" err="1"/>
+              <a:t>shop</a:t>
+            </a:r>
+            <a:endParaRPr lang="de-DE" dirty="0"/>
           </a:p>
         </p:txBody>
       </p:sp>
@@ -5996,9 +5997,10 @@
               <a:rPr lang="de-DE" dirty="0"/>
             </a:br>
             <a:r>
-              <a:rPr lang="de-DE" dirty="0"/>
-              <a:t>Kunde</a:t>
-            </a:r>
+              <a:rPr lang="de-DE" dirty="0" err="1"/>
+              <a:t>person</a:t>
+            </a:r>
+            <a:endParaRPr lang="de-DE" dirty="0"/>
           </a:p>
         </p:txBody>
       </p:sp>
@@ -6104,9 +6106,10 @@
               <a:rPr lang="de-DE" dirty="0"/>
             </a:br>
             <a:r>
-              <a:rPr lang="de-DE" dirty="0"/>
-              <a:t>Auftrag</a:t>
-            </a:r>
+              <a:rPr lang="de-DE" dirty="0" err="1"/>
+              <a:t>auftrag</a:t>
+            </a:r>
+            <a:endParaRPr lang="de-DE" dirty="0"/>
           </a:p>
         </p:txBody>
       </p:sp>

</xml_diff>

<commit_message>
update slides, add summary
</commit_message>
<xml_diff>
--- a/Architektur.pptx
+++ b/Architektur.pptx
@@ -9,9 +9,6 @@
     <p:sldId id="257" r:id="rId3"/>
     <p:sldId id="258" r:id="rId4"/>
     <p:sldId id="259" r:id="rId5"/>
-    <p:sldId id="260" r:id="rId6"/>
-    <p:sldId id="261" r:id="rId7"/>
-    <p:sldId id="262" r:id="rId8"/>
   </p:sldIdLst>
   <p:sldSz cx="12192000" cy="6858000"/>
   <p:notesSz cx="6858000" cy="9144000"/>
@@ -265,7 +262,7 @@
           <a:p>
             <a:fld id="{66EF7BA3-99A7-BB4E-8AD5-910021624372}" type="datetimeFigureOut">
               <a:rPr lang="de-DE" smtClean="0"/>
-              <a:t>04.05.22</a:t>
+              <a:t>11.05.22</a:t>
             </a:fld>
             <a:endParaRPr lang="de-DE"/>
           </a:p>
@@ -463,7 +460,7 @@
           <a:p>
             <a:fld id="{66EF7BA3-99A7-BB4E-8AD5-910021624372}" type="datetimeFigureOut">
               <a:rPr lang="de-DE" smtClean="0"/>
-              <a:t>04.05.22</a:t>
+              <a:t>11.05.22</a:t>
             </a:fld>
             <a:endParaRPr lang="de-DE"/>
           </a:p>
@@ -671,7 +668,7 @@
           <a:p>
             <a:fld id="{66EF7BA3-99A7-BB4E-8AD5-910021624372}" type="datetimeFigureOut">
               <a:rPr lang="de-DE" smtClean="0"/>
-              <a:t>04.05.22</a:t>
+              <a:t>11.05.22</a:t>
             </a:fld>
             <a:endParaRPr lang="de-DE"/>
           </a:p>
@@ -869,7 +866,7 @@
           <a:p>
             <a:fld id="{66EF7BA3-99A7-BB4E-8AD5-910021624372}" type="datetimeFigureOut">
               <a:rPr lang="de-DE" smtClean="0"/>
-              <a:t>04.05.22</a:t>
+              <a:t>11.05.22</a:t>
             </a:fld>
             <a:endParaRPr lang="de-DE"/>
           </a:p>
@@ -1144,7 +1141,7 @@
           <a:p>
             <a:fld id="{66EF7BA3-99A7-BB4E-8AD5-910021624372}" type="datetimeFigureOut">
               <a:rPr lang="de-DE" smtClean="0"/>
-              <a:t>04.05.22</a:t>
+              <a:t>11.05.22</a:t>
             </a:fld>
             <a:endParaRPr lang="de-DE"/>
           </a:p>
@@ -1409,7 +1406,7 @@
           <a:p>
             <a:fld id="{66EF7BA3-99A7-BB4E-8AD5-910021624372}" type="datetimeFigureOut">
               <a:rPr lang="de-DE" smtClean="0"/>
-              <a:t>04.05.22</a:t>
+              <a:t>11.05.22</a:t>
             </a:fld>
             <a:endParaRPr lang="de-DE"/>
           </a:p>
@@ -1821,7 +1818,7 @@
           <a:p>
             <a:fld id="{66EF7BA3-99A7-BB4E-8AD5-910021624372}" type="datetimeFigureOut">
               <a:rPr lang="de-DE" smtClean="0"/>
-              <a:t>04.05.22</a:t>
+              <a:t>11.05.22</a:t>
             </a:fld>
             <a:endParaRPr lang="de-DE"/>
           </a:p>
@@ -1962,7 +1959,7 @@
           <a:p>
             <a:fld id="{66EF7BA3-99A7-BB4E-8AD5-910021624372}" type="datetimeFigureOut">
               <a:rPr lang="de-DE" smtClean="0"/>
-              <a:t>04.05.22</a:t>
+              <a:t>11.05.22</a:t>
             </a:fld>
             <a:endParaRPr lang="de-DE"/>
           </a:p>
@@ -2075,7 +2072,7 @@
           <a:p>
             <a:fld id="{66EF7BA3-99A7-BB4E-8AD5-910021624372}" type="datetimeFigureOut">
               <a:rPr lang="de-DE" smtClean="0"/>
-              <a:t>04.05.22</a:t>
+              <a:t>11.05.22</a:t>
             </a:fld>
             <a:endParaRPr lang="de-DE"/>
           </a:p>
@@ -2386,7 +2383,7 @@
           <a:p>
             <a:fld id="{66EF7BA3-99A7-BB4E-8AD5-910021624372}" type="datetimeFigureOut">
               <a:rPr lang="de-DE" smtClean="0"/>
-              <a:t>04.05.22</a:t>
+              <a:t>11.05.22</a:t>
             </a:fld>
             <a:endParaRPr lang="de-DE"/>
           </a:p>
@@ -2674,7 +2671,7 @@
           <a:p>
             <a:fld id="{66EF7BA3-99A7-BB4E-8AD5-910021624372}" type="datetimeFigureOut">
               <a:rPr lang="de-DE" smtClean="0"/>
-              <a:t>04.05.22</a:t>
+              <a:t>11.05.22</a:t>
             </a:fld>
             <a:endParaRPr lang="de-DE"/>
           </a:p>
@@ -2915,7 +2912,7 @@
           <a:p>
             <a:fld id="{66EF7BA3-99A7-BB4E-8AD5-910021624372}" type="datetimeFigureOut">
               <a:rPr lang="de-DE" smtClean="0"/>
-              <a:t>04.05.22</a:t>
+              <a:t>11.05.22</a:t>
             </a:fld>
             <a:endParaRPr lang="de-DE"/>
           </a:p>
@@ -5551,3029 +5548,682 @@
           <a:chExt cx="0" cy="0"/>
         </a:xfrm>
       </p:grpSpPr>
-      <p:sp>
-        <p:nvSpPr>
-          <p:cNvPr id="4" name="Abgerundetes Rechteck 3">
-            <a:extLst>
-              <a:ext uri="{FF2B5EF4-FFF2-40B4-BE49-F238E27FC236}">
-                <a16:creationId xmlns:a16="http://schemas.microsoft.com/office/drawing/2014/main" id="{79BC28D4-3EF9-804B-82DA-C260F687E32D}"/>
-              </a:ext>
-            </a:extLst>
-          </p:cNvPr>
-          <p:cNvSpPr/>
+      <p:grpSp>
+        <p:nvGrpSpPr>
+          <p:cNvPr id="2" name="Gruppieren 1">
+            <a:extLst>
+              <a:ext uri="{FF2B5EF4-FFF2-40B4-BE49-F238E27FC236}">
+                <a16:creationId xmlns:a16="http://schemas.microsoft.com/office/drawing/2014/main" id="{0DF4FC58-03E3-57D7-F2A7-AFF74161A20D}"/>
+              </a:ext>
+            </a:extLst>
+          </p:cNvPr>
+          <p:cNvGrpSpPr/>
           <p:nvPr/>
-        </p:nvSpPr>
-        <p:spPr>
+        </p:nvGrpSpPr>
+        <p:grpSpPr>
           <a:xfrm>
-            <a:off x="3646715" y="337456"/>
-            <a:ext cx="4637314" cy="794658"/>
-          </a:xfrm>
-          <a:prstGeom prst="roundRect">
-            <a:avLst/>
-          </a:prstGeom>
-        </p:spPr>
-        <p:style>
-          <a:lnRef idx="2">
-            <a:schemeClr val="accent1">
-              <a:shade val="50000"/>
-            </a:schemeClr>
-          </a:lnRef>
-          <a:fillRef idx="1">
-            <a:schemeClr val="accent1"/>
-          </a:fillRef>
-          <a:effectRef idx="0">
-            <a:schemeClr val="accent1"/>
-          </a:effectRef>
-          <a:fontRef idx="minor">
-            <a:schemeClr val="lt1"/>
-          </a:fontRef>
-        </p:style>
-        <p:txBody>
-          <a:bodyPr rtlCol="0" anchor="ctr"/>
-          <a:lstStyle/>
-          <a:p>
-            <a:pPr algn="ctr"/>
-            <a:r>
-              <a:rPr lang="de-DE" dirty="0"/>
-              <a:t>Browser</a:t>
-            </a:r>
-            <a:br>
-              <a:rPr lang="de-DE" dirty="0"/>
-            </a:br>
-            <a:r>
-              <a:rPr lang="de-DE" dirty="0"/>
-              <a:t>HTML</a:t>
-            </a:r>
-          </a:p>
-        </p:txBody>
-      </p:sp>
-      <p:sp>
-        <p:nvSpPr>
-          <p:cNvPr id="5" name="Abgerundetes Rechteck 4">
-            <a:extLst>
-              <a:ext uri="{FF2B5EF4-FFF2-40B4-BE49-F238E27FC236}">
-                <a16:creationId xmlns:a16="http://schemas.microsoft.com/office/drawing/2014/main" id="{C9E7511D-A024-5043-B96A-C26F19AAB85E}"/>
-              </a:ext>
-            </a:extLst>
-          </p:cNvPr>
-          <p:cNvSpPr/>
-          <p:nvPr/>
-        </p:nvSpPr>
-        <p:spPr>
-          <a:xfrm>
-            <a:off x="4597879" y="1889655"/>
-            <a:ext cx="2606171" cy="892629"/>
-          </a:xfrm>
-          <a:prstGeom prst="roundRect">
-            <a:avLst/>
-          </a:prstGeom>
-          <a:solidFill>
-            <a:schemeClr val="accent2">
-              <a:lumMod val="60000"/>
-              <a:lumOff val="40000"/>
-            </a:schemeClr>
-          </a:solidFill>
-        </p:spPr>
-        <p:style>
-          <a:lnRef idx="2">
-            <a:schemeClr val="accent1">
-              <a:shade val="50000"/>
-            </a:schemeClr>
-          </a:lnRef>
-          <a:fillRef idx="1">
-            <a:schemeClr val="accent1"/>
-          </a:fillRef>
-          <a:effectRef idx="0">
-            <a:schemeClr val="accent1"/>
-          </a:effectRef>
-          <a:fontRef idx="minor">
-            <a:schemeClr val="lt1"/>
-          </a:fontRef>
-        </p:style>
-        <p:txBody>
-          <a:bodyPr rtlCol="0" anchor="ctr"/>
-          <a:lstStyle/>
-          <a:p>
-            <a:pPr algn="ctr"/>
-            <a:r>
-              <a:rPr lang="de-DE" dirty="0" err="1"/>
-              <a:t>MicroService</a:t>
-            </a:r>
-            <a:br>
-              <a:rPr lang="de-DE" dirty="0"/>
-            </a:br>
-            <a:r>
-              <a:rPr lang="de-DE" dirty="0" err="1"/>
-              <a:t>shop</a:t>
-            </a:r>
-            <a:endParaRPr lang="de-DE" dirty="0"/>
-          </a:p>
-        </p:txBody>
-      </p:sp>
-      <p:cxnSp>
-        <p:nvCxnSpPr>
-          <p:cNvPr id="7" name="Gerade Verbindung mit Pfeil 6">
-            <a:extLst>
-              <a:ext uri="{FF2B5EF4-FFF2-40B4-BE49-F238E27FC236}">
-                <a16:creationId xmlns:a16="http://schemas.microsoft.com/office/drawing/2014/main" id="{7EA12433-B077-C346-B199-60BE14EA375F}"/>
-              </a:ext>
-            </a:extLst>
-          </p:cNvPr>
-          <p:cNvCxnSpPr>
-            <a:cxnSpLocks/>
-            <a:stCxn id="4" idx="2"/>
-            <a:endCxn id="5" idx="0"/>
-          </p:cNvCxnSpPr>
-          <p:nvPr/>
-        </p:nvCxnSpPr>
-        <p:spPr>
-          <a:xfrm flipH="1">
-            <a:off x="5900965" y="1132114"/>
-            <a:ext cx="64407" cy="757541"/>
-          </a:xfrm>
-          <a:prstGeom prst="straightConnector1">
-            <a:avLst/>
-          </a:prstGeom>
-          <a:ln w="38100">
-            <a:tailEnd type="triangle"/>
-          </a:ln>
-        </p:spPr>
-        <p:style>
-          <a:lnRef idx="1">
-            <a:schemeClr val="accent1"/>
-          </a:lnRef>
-          <a:fillRef idx="0">
-            <a:schemeClr val="accent1"/>
-          </a:fillRef>
-          <a:effectRef idx="0">
-            <a:schemeClr val="accent1"/>
-          </a:effectRef>
-          <a:fontRef idx="minor">
-            <a:schemeClr val="tx1"/>
-          </a:fontRef>
-        </p:style>
-      </p:cxnSp>
-      <p:cxnSp>
-        <p:nvCxnSpPr>
-          <p:cNvPr id="13" name="Gerade Verbindung mit Pfeil 12">
-            <a:extLst>
-              <a:ext uri="{FF2B5EF4-FFF2-40B4-BE49-F238E27FC236}">
-                <a16:creationId xmlns:a16="http://schemas.microsoft.com/office/drawing/2014/main" id="{38590E46-A719-2441-90F2-D877DA52215C}"/>
-              </a:ext>
-            </a:extLst>
-          </p:cNvPr>
-          <p:cNvCxnSpPr>
-            <a:cxnSpLocks/>
-            <a:stCxn id="5" idx="2"/>
-            <a:endCxn id="36" idx="0"/>
-          </p:cNvCxnSpPr>
-          <p:nvPr/>
-        </p:nvCxnSpPr>
-        <p:spPr>
-          <a:xfrm flipH="1">
-            <a:off x="4095889" y="2782284"/>
-            <a:ext cx="1805076" cy="792926"/>
-          </a:xfrm>
-          <a:prstGeom prst="straightConnector1">
-            <a:avLst/>
-          </a:prstGeom>
-          <a:ln w="38100">
-            <a:tailEnd type="triangle"/>
-          </a:ln>
-        </p:spPr>
-        <p:style>
-          <a:lnRef idx="1">
-            <a:schemeClr val="accent1"/>
-          </a:lnRef>
-          <a:fillRef idx="0">
-            <a:schemeClr val="accent1"/>
-          </a:fillRef>
-          <a:effectRef idx="0">
-            <a:schemeClr val="accent1"/>
-          </a:effectRef>
-          <a:fontRef idx="minor">
-            <a:schemeClr val="tx1"/>
-          </a:fontRef>
-        </p:style>
-      </p:cxnSp>
-      <p:sp>
-        <p:nvSpPr>
-          <p:cNvPr id="28" name="Magnetplattenspeicher 27">
-            <a:extLst>
-              <a:ext uri="{FF2B5EF4-FFF2-40B4-BE49-F238E27FC236}">
-                <a16:creationId xmlns:a16="http://schemas.microsoft.com/office/drawing/2014/main" id="{9343B73B-6448-4443-B86D-6669D318D430}"/>
-              </a:ext>
-            </a:extLst>
-          </p:cNvPr>
-          <p:cNvSpPr/>
-          <p:nvPr/>
-        </p:nvSpPr>
-        <p:spPr>
-          <a:xfrm>
-            <a:off x="8284029" y="4687816"/>
-            <a:ext cx="649514" cy="702128"/>
-          </a:xfrm>
-          <a:prstGeom prst="flowChartMagneticDisk">
-            <a:avLst/>
-          </a:prstGeom>
-        </p:spPr>
-        <p:style>
-          <a:lnRef idx="2">
-            <a:schemeClr val="accent1">
-              <a:shade val="50000"/>
-            </a:schemeClr>
-          </a:lnRef>
-          <a:fillRef idx="1">
-            <a:schemeClr val="accent1"/>
-          </a:fillRef>
-          <a:effectRef idx="0">
-            <a:schemeClr val="accent1"/>
-          </a:effectRef>
-          <a:fontRef idx="minor">
-            <a:schemeClr val="lt1"/>
-          </a:fontRef>
-        </p:style>
-        <p:txBody>
-          <a:bodyPr rtlCol="0" anchor="ctr"/>
-          <a:lstStyle/>
-          <a:p>
-            <a:pPr algn="ctr"/>
-            <a:endParaRPr lang="de-DE"/>
-          </a:p>
-        </p:txBody>
-      </p:sp>
-      <p:cxnSp>
-        <p:nvCxnSpPr>
-          <p:cNvPr id="35" name="Gerade Verbindung mit Pfeil 34">
-            <a:extLst>
-              <a:ext uri="{FF2B5EF4-FFF2-40B4-BE49-F238E27FC236}">
-                <a16:creationId xmlns:a16="http://schemas.microsoft.com/office/drawing/2014/main" id="{F60B072C-6DFB-7542-A5BF-A3FCB3709BF7}"/>
-              </a:ext>
-            </a:extLst>
-          </p:cNvPr>
-          <p:cNvCxnSpPr>
-            <a:cxnSpLocks/>
-            <a:stCxn id="36" idx="2"/>
-            <a:endCxn id="45" idx="1"/>
-          </p:cNvCxnSpPr>
-          <p:nvPr/>
-        </p:nvCxnSpPr>
-        <p:spPr>
-          <a:xfrm>
-            <a:off x="4095889" y="4467839"/>
-            <a:ext cx="1244310" cy="534386"/>
-          </a:xfrm>
-          <a:prstGeom prst="straightConnector1">
-            <a:avLst/>
-          </a:prstGeom>
-          <a:ln w="38100">
-            <a:tailEnd type="triangle"/>
-          </a:ln>
-        </p:spPr>
-        <p:style>
-          <a:lnRef idx="1">
-            <a:schemeClr val="accent1"/>
-          </a:lnRef>
-          <a:fillRef idx="0">
-            <a:schemeClr val="accent1"/>
-          </a:fillRef>
-          <a:effectRef idx="0">
-            <a:schemeClr val="accent1"/>
-          </a:effectRef>
-          <a:fontRef idx="minor">
-            <a:schemeClr val="tx1"/>
-          </a:fontRef>
-        </p:style>
-      </p:cxnSp>
-      <p:sp>
-        <p:nvSpPr>
-          <p:cNvPr id="43" name="Abgerundetes Rechteck 42">
-            <a:extLst>
-              <a:ext uri="{FF2B5EF4-FFF2-40B4-BE49-F238E27FC236}">
-                <a16:creationId xmlns:a16="http://schemas.microsoft.com/office/drawing/2014/main" id="{FC74CC00-0FC9-9F47-80DD-220CFFFBDC7A}"/>
-              </a:ext>
-            </a:extLst>
-          </p:cNvPr>
-          <p:cNvSpPr/>
-          <p:nvPr/>
-        </p:nvSpPr>
-        <p:spPr>
-          <a:xfrm>
-            <a:off x="984849" y="1738538"/>
-            <a:ext cx="2106591" cy="892629"/>
-          </a:xfrm>
-          <a:prstGeom prst="roundRect">
-            <a:avLst/>
-          </a:prstGeom>
-          <a:solidFill>
-            <a:schemeClr val="accent2">
-              <a:lumMod val="60000"/>
-              <a:lumOff val="40000"/>
-            </a:schemeClr>
-          </a:solidFill>
-        </p:spPr>
-        <p:style>
-          <a:lnRef idx="2">
-            <a:schemeClr val="accent1">
-              <a:shade val="50000"/>
-            </a:schemeClr>
-          </a:lnRef>
-          <a:fillRef idx="1">
-            <a:schemeClr val="accent1"/>
-          </a:fillRef>
-          <a:effectRef idx="0">
-            <a:schemeClr val="accent1"/>
-          </a:effectRef>
-          <a:fontRef idx="minor">
-            <a:schemeClr val="lt1"/>
-          </a:fontRef>
-        </p:style>
-        <p:txBody>
-          <a:bodyPr rtlCol="0" anchor="ctr"/>
-          <a:lstStyle/>
-          <a:p>
-            <a:pPr algn="ctr"/>
-            <a:r>
-              <a:rPr lang="de-DE" dirty="0" err="1"/>
-              <a:t>WebServer</a:t>
-            </a:r>
-            <a:endParaRPr lang="de-DE" dirty="0"/>
-          </a:p>
-        </p:txBody>
-      </p:sp>
-      <p:cxnSp>
-        <p:nvCxnSpPr>
-          <p:cNvPr id="44" name="Gerade Verbindung mit Pfeil 43">
-            <a:extLst>
-              <a:ext uri="{FF2B5EF4-FFF2-40B4-BE49-F238E27FC236}">
-                <a16:creationId xmlns:a16="http://schemas.microsoft.com/office/drawing/2014/main" id="{30CB8BCD-2332-9548-902D-CFD0570A4897}"/>
-              </a:ext>
-            </a:extLst>
-          </p:cNvPr>
-          <p:cNvCxnSpPr>
-            <a:cxnSpLocks/>
-            <a:stCxn id="4" idx="2"/>
-            <a:endCxn id="43" idx="0"/>
-          </p:cNvCxnSpPr>
-          <p:nvPr/>
-        </p:nvCxnSpPr>
-        <p:spPr>
-          <a:xfrm flipH="1">
-            <a:off x="2038145" y="1132114"/>
-            <a:ext cx="3927227" cy="606424"/>
-          </a:xfrm>
-          <a:prstGeom prst="straightConnector1">
-            <a:avLst/>
-          </a:prstGeom>
-          <a:ln w="38100">
-            <a:tailEnd type="triangle"/>
-          </a:ln>
-        </p:spPr>
-        <p:style>
-          <a:lnRef idx="1">
-            <a:schemeClr val="accent1"/>
-          </a:lnRef>
-          <a:fillRef idx="0">
-            <a:schemeClr val="accent1"/>
-          </a:fillRef>
-          <a:effectRef idx="0">
-            <a:schemeClr val="accent1"/>
-          </a:effectRef>
-          <a:fontRef idx="minor">
-            <a:schemeClr val="tx1"/>
-          </a:fontRef>
-        </p:style>
-      </p:cxnSp>
-      <p:sp>
-        <p:nvSpPr>
-          <p:cNvPr id="36" name="Abgerundetes Rechteck 35">
-            <a:extLst>
-              <a:ext uri="{FF2B5EF4-FFF2-40B4-BE49-F238E27FC236}">
-                <a16:creationId xmlns:a16="http://schemas.microsoft.com/office/drawing/2014/main" id="{54D430FF-2891-4B4D-92F9-4E4825667ACF}"/>
-              </a:ext>
-            </a:extLst>
-          </p:cNvPr>
-          <p:cNvSpPr/>
-          <p:nvPr/>
-        </p:nvSpPr>
-        <p:spPr>
-          <a:xfrm>
-            <a:off x="2896098" y="3575210"/>
-            <a:ext cx="2399581" cy="892629"/>
-          </a:xfrm>
-          <a:prstGeom prst="roundRect">
-            <a:avLst/>
-          </a:prstGeom>
-          <a:solidFill>
-            <a:schemeClr val="accent2">
-              <a:lumMod val="60000"/>
-              <a:lumOff val="40000"/>
-            </a:schemeClr>
-          </a:solidFill>
-        </p:spPr>
-        <p:style>
-          <a:lnRef idx="2">
-            <a:schemeClr val="accent1">
-              <a:shade val="50000"/>
-            </a:schemeClr>
-          </a:lnRef>
-          <a:fillRef idx="1">
-            <a:schemeClr val="accent1"/>
-          </a:fillRef>
-          <a:effectRef idx="0">
-            <a:schemeClr val="accent1"/>
-          </a:effectRef>
-          <a:fontRef idx="minor">
-            <a:schemeClr val="lt1"/>
-          </a:fontRef>
-        </p:style>
-        <p:txBody>
-          <a:bodyPr rtlCol="0" anchor="ctr"/>
-          <a:lstStyle/>
-          <a:p>
-            <a:pPr algn="ctr"/>
-            <a:r>
-              <a:rPr lang="de-DE" dirty="0" err="1"/>
-              <a:t>MicroService</a:t>
-            </a:r>
-            <a:br>
-              <a:rPr lang="de-DE" dirty="0"/>
-            </a:br>
-            <a:r>
-              <a:rPr lang="de-DE" dirty="0" err="1"/>
-              <a:t>person</a:t>
-            </a:r>
-            <a:endParaRPr lang="de-DE" dirty="0"/>
-          </a:p>
-        </p:txBody>
-      </p:sp>
-      <p:sp>
-        <p:nvSpPr>
-          <p:cNvPr id="45" name="Magnetplattenspeicher 44">
-            <a:extLst>
-              <a:ext uri="{FF2B5EF4-FFF2-40B4-BE49-F238E27FC236}">
-                <a16:creationId xmlns:a16="http://schemas.microsoft.com/office/drawing/2014/main" id="{B014ABC0-DA58-B548-9464-5CEC15ECA332}"/>
-              </a:ext>
-            </a:extLst>
-          </p:cNvPr>
-          <p:cNvSpPr/>
-          <p:nvPr/>
-        </p:nvSpPr>
-        <p:spPr>
-          <a:xfrm>
-            <a:off x="5015442" y="5002225"/>
-            <a:ext cx="649514" cy="702128"/>
-          </a:xfrm>
-          <a:prstGeom prst="flowChartMagneticDisk">
-            <a:avLst/>
-          </a:prstGeom>
-        </p:spPr>
-        <p:style>
-          <a:lnRef idx="2">
-            <a:schemeClr val="accent1">
-              <a:shade val="50000"/>
-            </a:schemeClr>
-          </a:lnRef>
-          <a:fillRef idx="1">
-            <a:schemeClr val="accent1"/>
-          </a:fillRef>
-          <a:effectRef idx="0">
-            <a:schemeClr val="accent1"/>
-          </a:effectRef>
-          <a:fontRef idx="minor">
-            <a:schemeClr val="lt1"/>
-          </a:fontRef>
-        </p:style>
-        <p:txBody>
-          <a:bodyPr rtlCol="0" anchor="ctr"/>
-          <a:lstStyle/>
-          <a:p>
-            <a:pPr algn="ctr"/>
-            <a:endParaRPr lang="de-DE"/>
-          </a:p>
-        </p:txBody>
-      </p:sp>
-      <p:sp>
-        <p:nvSpPr>
-          <p:cNvPr id="62" name="Abgerundetes Rechteck 61">
-            <a:extLst>
-              <a:ext uri="{FF2B5EF4-FFF2-40B4-BE49-F238E27FC236}">
-                <a16:creationId xmlns:a16="http://schemas.microsoft.com/office/drawing/2014/main" id="{CC6DBFE9-F260-864A-832C-FC081522D987}"/>
-              </a:ext>
-            </a:extLst>
-          </p:cNvPr>
-          <p:cNvSpPr/>
-          <p:nvPr/>
-        </p:nvSpPr>
-        <p:spPr>
-          <a:xfrm>
-            <a:off x="6396350" y="3523796"/>
-            <a:ext cx="2399581" cy="892629"/>
-          </a:xfrm>
-          <a:prstGeom prst="roundRect">
-            <a:avLst/>
-          </a:prstGeom>
-          <a:solidFill>
-            <a:schemeClr val="accent2">
-              <a:lumMod val="60000"/>
-              <a:lumOff val="40000"/>
-            </a:schemeClr>
-          </a:solidFill>
-        </p:spPr>
-        <p:style>
-          <a:lnRef idx="2">
-            <a:schemeClr val="accent1">
-              <a:shade val="50000"/>
-            </a:schemeClr>
-          </a:lnRef>
-          <a:fillRef idx="1">
-            <a:schemeClr val="accent1"/>
-          </a:fillRef>
-          <a:effectRef idx="0">
-            <a:schemeClr val="accent1"/>
-          </a:effectRef>
-          <a:fontRef idx="minor">
-            <a:schemeClr val="lt1"/>
-          </a:fontRef>
-        </p:style>
-        <p:txBody>
-          <a:bodyPr rtlCol="0" anchor="ctr"/>
-          <a:lstStyle/>
-          <a:p>
-            <a:pPr algn="ctr"/>
-            <a:r>
-              <a:rPr lang="de-DE" dirty="0" err="1"/>
-              <a:t>MicroService</a:t>
-            </a:r>
-            <a:br>
-              <a:rPr lang="de-DE" dirty="0"/>
-            </a:br>
-            <a:r>
-              <a:rPr lang="de-DE" dirty="0" err="1"/>
-              <a:t>auftrag</a:t>
-            </a:r>
-            <a:endParaRPr lang="de-DE" dirty="0"/>
-          </a:p>
-        </p:txBody>
-      </p:sp>
-      <p:cxnSp>
-        <p:nvCxnSpPr>
-          <p:cNvPr id="63" name="Gerade Verbindung mit Pfeil 62">
-            <a:extLst>
-              <a:ext uri="{FF2B5EF4-FFF2-40B4-BE49-F238E27FC236}">
-                <a16:creationId xmlns:a16="http://schemas.microsoft.com/office/drawing/2014/main" id="{EF77C060-69E3-224E-952B-B54E2A6A27D9}"/>
-              </a:ext>
-            </a:extLst>
-          </p:cNvPr>
-          <p:cNvCxnSpPr>
-            <a:cxnSpLocks/>
-            <a:stCxn id="5" idx="2"/>
-            <a:endCxn id="62" idx="0"/>
-          </p:cNvCxnSpPr>
-          <p:nvPr/>
-        </p:nvCxnSpPr>
-        <p:spPr>
-          <a:xfrm>
-            <a:off x="5900965" y="2782284"/>
-            <a:ext cx="1695176" cy="741512"/>
-          </a:xfrm>
-          <a:prstGeom prst="straightConnector1">
-            <a:avLst/>
-          </a:prstGeom>
-          <a:ln w="38100">
-            <a:tailEnd type="triangle"/>
-          </a:ln>
-        </p:spPr>
-        <p:style>
-          <a:lnRef idx="1">
-            <a:schemeClr val="accent1"/>
-          </a:lnRef>
-          <a:fillRef idx="0">
-            <a:schemeClr val="accent1"/>
-          </a:fillRef>
-          <a:effectRef idx="0">
-            <a:schemeClr val="accent1"/>
-          </a:effectRef>
-          <a:fontRef idx="minor">
-            <a:schemeClr val="tx1"/>
-          </a:fontRef>
-        </p:style>
-      </p:cxnSp>
-      <p:cxnSp>
-        <p:nvCxnSpPr>
-          <p:cNvPr id="67" name="Gerade Verbindung mit Pfeil 66">
-            <a:extLst>
-              <a:ext uri="{FF2B5EF4-FFF2-40B4-BE49-F238E27FC236}">
-                <a16:creationId xmlns:a16="http://schemas.microsoft.com/office/drawing/2014/main" id="{0C5BEB8E-92C2-E341-BC63-5A4A0C09CCE9}"/>
-              </a:ext>
-            </a:extLst>
-          </p:cNvPr>
-          <p:cNvCxnSpPr>
-            <a:cxnSpLocks/>
-            <a:stCxn id="62" idx="2"/>
-            <a:endCxn id="28" idx="1"/>
-          </p:cNvCxnSpPr>
-          <p:nvPr/>
-        </p:nvCxnSpPr>
-        <p:spPr>
-          <a:xfrm>
-            <a:off x="7596141" y="4416425"/>
-            <a:ext cx="1012645" cy="271391"/>
-          </a:xfrm>
-          <a:prstGeom prst="straightConnector1">
-            <a:avLst/>
-          </a:prstGeom>
-          <a:ln w="38100">
-            <a:tailEnd type="triangle"/>
-          </a:ln>
-        </p:spPr>
-        <p:style>
-          <a:lnRef idx="1">
-            <a:schemeClr val="accent1"/>
-          </a:lnRef>
-          <a:fillRef idx="0">
-            <a:schemeClr val="accent1"/>
-          </a:fillRef>
-          <a:effectRef idx="0">
-            <a:schemeClr val="accent1"/>
-          </a:effectRef>
-          <a:fontRef idx="minor">
-            <a:schemeClr val="tx1"/>
-          </a:fontRef>
-        </p:style>
-      </p:cxnSp>
+            <a:off x="984849" y="337456"/>
+            <a:ext cx="7948694" cy="5366897"/>
+            <a:chOff x="984849" y="337456"/>
+            <a:chExt cx="7948694" cy="5366897"/>
+          </a:xfrm>
+        </p:grpSpPr>
+        <p:sp>
+          <p:nvSpPr>
+            <p:cNvPr id="4" name="Abgerundetes Rechteck 3">
+              <a:extLst>
+                <a:ext uri="{FF2B5EF4-FFF2-40B4-BE49-F238E27FC236}">
+                  <a16:creationId xmlns:a16="http://schemas.microsoft.com/office/drawing/2014/main" id="{79BC28D4-3EF9-804B-82DA-C260F687E32D}"/>
+                </a:ext>
+              </a:extLst>
+            </p:cNvPr>
+            <p:cNvSpPr/>
+            <p:nvPr/>
+          </p:nvSpPr>
+          <p:spPr>
+            <a:xfrm>
+              <a:off x="3646715" y="337456"/>
+              <a:ext cx="4637314" cy="794658"/>
+            </a:xfrm>
+            <a:prstGeom prst="roundRect">
+              <a:avLst/>
+            </a:prstGeom>
+          </p:spPr>
+          <p:style>
+            <a:lnRef idx="2">
+              <a:schemeClr val="accent1">
+                <a:shade val="50000"/>
+              </a:schemeClr>
+            </a:lnRef>
+            <a:fillRef idx="1">
+              <a:schemeClr val="accent1"/>
+            </a:fillRef>
+            <a:effectRef idx="0">
+              <a:schemeClr val="accent1"/>
+            </a:effectRef>
+            <a:fontRef idx="minor">
+              <a:schemeClr val="lt1"/>
+            </a:fontRef>
+          </p:style>
+          <p:txBody>
+            <a:bodyPr rtlCol="0" anchor="ctr"/>
+            <a:lstStyle/>
+            <a:p>
+              <a:pPr algn="ctr"/>
+              <a:r>
+                <a:rPr lang="de-DE" dirty="0"/>
+                <a:t>Browser</a:t>
+              </a:r>
+              <a:br>
+                <a:rPr lang="de-DE" dirty="0"/>
+              </a:br>
+              <a:r>
+                <a:rPr lang="de-DE" dirty="0"/>
+                <a:t>HTML</a:t>
+              </a:r>
+            </a:p>
+          </p:txBody>
+        </p:sp>
+        <p:sp>
+          <p:nvSpPr>
+            <p:cNvPr id="5" name="Abgerundetes Rechteck 4">
+              <a:extLst>
+                <a:ext uri="{FF2B5EF4-FFF2-40B4-BE49-F238E27FC236}">
+                  <a16:creationId xmlns:a16="http://schemas.microsoft.com/office/drawing/2014/main" id="{C9E7511D-A024-5043-B96A-C26F19AAB85E}"/>
+                </a:ext>
+              </a:extLst>
+            </p:cNvPr>
+            <p:cNvSpPr/>
+            <p:nvPr/>
+          </p:nvSpPr>
+          <p:spPr>
+            <a:xfrm>
+              <a:off x="4597879" y="1889655"/>
+              <a:ext cx="2606171" cy="892629"/>
+            </a:xfrm>
+            <a:prstGeom prst="roundRect">
+              <a:avLst/>
+            </a:prstGeom>
+            <a:solidFill>
+              <a:schemeClr val="accent2">
+                <a:lumMod val="60000"/>
+                <a:lumOff val="40000"/>
+              </a:schemeClr>
+            </a:solidFill>
+          </p:spPr>
+          <p:style>
+            <a:lnRef idx="2">
+              <a:schemeClr val="accent1">
+                <a:shade val="50000"/>
+              </a:schemeClr>
+            </a:lnRef>
+            <a:fillRef idx="1">
+              <a:schemeClr val="accent1"/>
+            </a:fillRef>
+            <a:effectRef idx="0">
+              <a:schemeClr val="accent1"/>
+            </a:effectRef>
+            <a:fontRef idx="minor">
+              <a:schemeClr val="lt1"/>
+            </a:fontRef>
+          </p:style>
+          <p:txBody>
+            <a:bodyPr rtlCol="0" anchor="ctr"/>
+            <a:lstStyle/>
+            <a:p>
+              <a:pPr algn="ctr"/>
+              <a:r>
+                <a:rPr lang="de-DE" dirty="0" err="1"/>
+                <a:t>MicroService</a:t>
+              </a:r>
+              <a:br>
+                <a:rPr lang="de-DE" dirty="0"/>
+              </a:br>
+              <a:r>
+                <a:rPr lang="de-DE" dirty="0" err="1"/>
+                <a:t>shop</a:t>
+              </a:r>
+              <a:endParaRPr lang="de-DE" dirty="0"/>
+            </a:p>
+          </p:txBody>
+        </p:sp>
+        <p:cxnSp>
+          <p:nvCxnSpPr>
+            <p:cNvPr id="7" name="Gerade Verbindung mit Pfeil 6">
+              <a:extLst>
+                <a:ext uri="{FF2B5EF4-FFF2-40B4-BE49-F238E27FC236}">
+                  <a16:creationId xmlns:a16="http://schemas.microsoft.com/office/drawing/2014/main" id="{7EA12433-B077-C346-B199-60BE14EA375F}"/>
+                </a:ext>
+              </a:extLst>
+            </p:cNvPr>
+            <p:cNvCxnSpPr>
+              <a:cxnSpLocks/>
+              <a:stCxn id="4" idx="2"/>
+              <a:endCxn id="5" idx="0"/>
+            </p:cNvCxnSpPr>
+            <p:nvPr/>
+          </p:nvCxnSpPr>
+          <p:spPr>
+            <a:xfrm flipH="1">
+              <a:off x="5900965" y="1132114"/>
+              <a:ext cx="64407" cy="757541"/>
+            </a:xfrm>
+            <a:prstGeom prst="straightConnector1">
+              <a:avLst/>
+            </a:prstGeom>
+            <a:ln w="38100">
+              <a:tailEnd type="triangle"/>
+            </a:ln>
+          </p:spPr>
+          <p:style>
+            <a:lnRef idx="1">
+              <a:schemeClr val="accent1"/>
+            </a:lnRef>
+            <a:fillRef idx="0">
+              <a:schemeClr val="accent1"/>
+            </a:fillRef>
+            <a:effectRef idx="0">
+              <a:schemeClr val="accent1"/>
+            </a:effectRef>
+            <a:fontRef idx="minor">
+              <a:schemeClr val="tx1"/>
+            </a:fontRef>
+          </p:style>
+        </p:cxnSp>
+        <p:cxnSp>
+          <p:nvCxnSpPr>
+            <p:cNvPr id="13" name="Gerade Verbindung mit Pfeil 12">
+              <a:extLst>
+                <a:ext uri="{FF2B5EF4-FFF2-40B4-BE49-F238E27FC236}">
+                  <a16:creationId xmlns:a16="http://schemas.microsoft.com/office/drawing/2014/main" id="{38590E46-A719-2441-90F2-D877DA52215C}"/>
+                </a:ext>
+              </a:extLst>
+            </p:cNvPr>
+            <p:cNvCxnSpPr>
+              <a:cxnSpLocks/>
+              <a:stCxn id="5" idx="2"/>
+              <a:endCxn id="36" idx="0"/>
+            </p:cNvCxnSpPr>
+            <p:nvPr/>
+          </p:nvCxnSpPr>
+          <p:spPr>
+            <a:xfrm flipH="1">
+              <a:off x="4095889" y="2782284"/>
+              <a:ext cx="1805076" cy="792926"/>
+            </a:xfrm>
+            <a:prstGeom prst="straightConnector1">
+              <a:avLst/>
+            </a:prstGeom>
+            <a:ln w="38100">
+              <a:tailEnd type="triangle"/>
+            </a:ln>
+          </p:spPr>
+          <p:style>
+            <a:lnRef idx="1">
+              <a:schemeClr val="accent1"/>
+            </a:lnRef>
+            <a:fillRef idx="0">
+              <a:schemeClr val="accent1"/>
+            </a:fillRef>
+            <a:effectRef idx="0">
+              <a:schemeClr val="accent1"/>
+            </a:effectRef>
+            <a:fontRef idx="minor">
+              <a:schemeClr val="tx1"/>
+            </a:fontRef>
+          </p:style>
+        </p:cxnSp>
+        <p:sp>
+          <p:nvSpPr>
+            <p:cNvPr id="28" name="Magnetplattenspeicher 27">
+              <a:extLst>
+                <a:ext uri="{FF2B5EF4-FFF2-40B4-BE49-F238E27FC236}">
+                  <a16:creationId xmlns:a16="http://schemas.microsoft.com/office/drawing/2014/main" id="{9343B73B-6448-4443-B86D-6669D318D430}"/>
+                </a:ext>
+              </a:extLst>
+            </p:cNvPr>
+            <p:cNvSpPr/>
+            <p:nvPr/>
+          </p:nvSpPr>
+          <p:spPr>
+            <a:xfrm>
+              <a:off x="8284029" y="4687816"/>
+              <a:ext cx="649514" cy="702128"/>
+            </a:xfrm>
+            <a:prstGeom prst="flowChartMagneticDisk">
+              <a:avLst/>
+            </a:prstGeom>
+          </p:spPr>
+          <p:style>
+            <a:lnRef idx="2">
+              <a:schemeClr val="accent1">
+                <a:shade val="50000"/>
+              </a:schemeClr>
+            </a:lnRef>
+            <a:fillRef idx="1">
+              <a:schemeClr val="accent1"/>
+            </a:fillRef>
+            <a:effectRef idx="0">
+              <a:schemeClr val="accent1"/>
+            </a:effectRef>
+            <a:fontRef idx="minor">
+              <a:schemeClr val="lt1"/>
+            </a:fontRef>
+          </p:style>
+          <p:txBody>
+            <a:bodyPr rtlCol="0" anchor="ctr"/>
+            <a:lstStyle/>
+            <a:p>
+              <a:pPr algn="ctr"/>
+              <a:endParaRPr lang="de-DE"/>
+            </a:p>
+          </p:txBody>
+        </p:sp>
+        <p:cxnSp>
+          <p:nvCxnSpPr>
+            <p:cNvPr id="35" name="Gerade Verbindung mit Pfeil 34">
+              <a:extLst>
+                <a:ext uri="{FF2B5EF4-FFF2-40B4-BE49-F238E27FC236}">
+                  <a16:creationId xmlns:a16="http://schemas.microsoft.com/office/drawing/2014/main" id="{F60B072C-6DFB-7542-A5BF-A3FCB3709BF7}"/>
+                </a:ext>
+              </a:extLst>
+            </p:cNvPr>
+            <p:cNvCxnSpPr>
+              <a:cxnSpLocks/>
+              <a:stCxn id="36" idx="2"/>
+              <a:endCxn id="45" idx="1"/>
+            </p:cNvCxnSpPr>
+            <p:nvPr/>
+          </p:nvCxnSpPr>
+          <p:spPr>
+            <a:xfrm>
+              <a:off x="4095889" y="4467839"/>
+              <a:ext cx="1244310" cy="534386"/>
+            </a:xfrm>
+            <a:prstGeom prst="straightConnector1">
+              <a:avLst/>
+            </a:prstGeom>
+            <a:ln w="38100">
+              <a:tailEnd type="triangle"/>
+            </a:ln>
+          </p:spPr>
+          <p:style>
+            <a:lnRef idx="1">
+              <a:schemeClr val="accent1"/>
+            </a:lnRef>
+            <a:fillRef idx="0">
+              <a:schemeClr val="accent1"/>
+            </a:fillRef>
+            <a:effectRef idx="0">
+              <a:schemeClr val="accent1"/>
+            </a:effectRef>
+            <a:fontRef idx="minor">
+              <a:schemeClr val="tx1"/>
+            </a:fontRef>
+          </p:style>
+        </p:cxnSp>
+        <p:sp>
+          <p:nvSpPr>
+            <p:cNvPr id="43" name="Abgerundetes Rechteck 42">
+              <a:extLst>
+                <a:ext uri="{FF2B5EF4-FFF2-40B4-BE49-F238E27FC236}">
+                  <a16:creationId xmlns:a16="http://schemas.microsoft.com/office/drawing/2014/main" id="{FC74CC00-0FC9-9F47-80DD-220CFFFBDC7A}"/>
+                </a:ext>
+              </a:extLst>
+            </p:cNvPr>
+            <p:cNvSpPr/>
+            <p:nvPr/>
+          </p:nvSpPr>
+          <p:spPr>
+            <a:xfrm>
+              <a:off x="984849" y="1738538"/>
+              <a:ext cx="2106591" cy="892629"/>
+            </a:xfrm>
+            <a:prstGeom prst="roundRect">
+              <a:avLst/>
+            </a:prstGeom>
+            <a:solidFill>
+              <a:schemeClr val="accent2">
+                <a:lumMod val="60000"/>
+                <a:lumOff val="40000"/>
+              </a:schemeClr>
+            </a:solidFill>
+          </p:spPr>
+          <p:style>
+            <a:lnRef idx="2">
+              <a:schemeClr val="accent1">
+                <a:shade val="50000"/>
+              </a:schemeClr>
+            </a:lnRef>
+            <a:fillRef idx="1">
+              <a:schemeClr val="accent1"/>
+            </a:fillRef>
+            <a:effectRef idx="0">
+              <a:schemeClr val="accent1"/>
+            </a:effectRef>
+            <a:fontRef idx="minor">
+              <a:schemeClr val="lt1"/>
+            </a:fontRef>
+          </p:style>
+          <p:txBody>
+            <a:bodyPr rtlCol="0" anchor="ctr"/>
+            <a:lstStyle/>
+            <a:p>
+              <a:pPr algn="ctr"/>
+              <a:r>
+                <a:rPr lang="de-DE" dirty="0" err="1"/>
+                <a:t>WebServer</a:t>
+              </a:r>
+              <a:endParaRPr lang="de-DE" dirty="0"/>
+            </a:p>
+          </p:txBody>
+        </p:sp>
+        <p:cxnSp>
+          <p:nvCxnSpPr>
+            <p:cNvPr id="44" name="Gerade Verbindung mit Pfeil 43">
+              <a:extLst>
+                <a:ext uri="{FF2B5EF4-FFF2-40B4-BE49-F238E27FC236}">
+                  <a16:creationId xmlns:a16="http://schemas.microsoft.com/office/drawing/2014/main" id="{30CB8BCD-2332-9548-902D-CFD0570A4897}"/>
+                </a:ext>
+              </a:extLst>
+            </p:cNvPr>
+            <p:cNvCxnSpPr>
+              <a:cxnSpLocks/>
+              <a:stCxn id="4" idx="2"/>
+              <a:endCxn id="43" idx="0"/>
+            </p:cNvCxnSpPr>
+            <p:nvPr/>
+          </p:nvCxnSpPr>
+          <p:spPr>
+            <a:xfrm flipH="1">
+              <a:off x="2038145" y="1132114"/>
+              <a:ext cx="3927227" cy="606424"/>
+            </a:xfrm>
+            <a:prstGeom prst="straightConnector1">
+              <a:avLst/>
+            </a:prstGeom>
+            <a:ln w="38100">
+              <a:tailEnd type="triangle"/>
+            </a:ln>
+          </p:spPr>
+          <p:style>
+            <a:lnRef idx="1">
+              <a:schemeClr val="accent1"/>
+            </a:lnRef>
+            <a:fillRef idx="0">
+              <a:schemeClr val="accent1"/>
+            </a:fillRef>
+            <a:effectRef idx="0">
+              <a:schemeClr val="accent1"/>
+            </a:effectRef>
+            <a:fontRef idx="minor">
+              <a:schemeClr val="tx1"/>
+            </a:fontRef>
+          </p:style>
+        </p:cxnSp>
+        <p:sp>
+          <p:nvSpPr>
+            <p:cNvPr id="36" name="Abgerundetes Rechteck 35">
+              <a:extLst>
+                <a:ext uri="{FF2B5EF4-FFF2-40B4-BE49-F238E27FC236}">
+                  <a16:creationId xmlns:a16="http://schemas.microsoft.com/office/drawing/2014/main" id="{54D430FF-2891-4B4D-92F9-4E4825667ACF}"/>
+                </a:ext>
+              </a:extLst>
+            </p:cNvPr>
+            <p:cNvSpPr/>
+            <p:nvPr/>
+          </p:nvSpPr>
+          <p:spPr>
+            <a:xfrm>
+              <a:off x="2896098" y="3575210"/>
+              <a:ext cx="2399581" cy="892629"/>
+            </a:xfrm>
+            <a:prstGeom prst="roundRect">
+              <a:avLst/>
+            </a:prstGeom>
+            <a:solidFill>
+              <a:schemeClr val="accent2">
+                <a:lumMod val="60000"/>
+                <a:lumOff val="40000"/>
+              </a:schemeClr>
+            </a:solidFill>
+          </p:spPr>
+          <p:style>
+            <a:lnRef idx="2">
+              <a:schemeClr val="accent1">
+                <a:shade val="50000"/>
+              </a:schemeClr>
+            </a:lnRef>
+            <a:fillRef idx="1">
+              <a:schemeClr val="accent1"/>
+            </a:fillRef>
+            <a:effectRef idx="0">
+              <a:schemeClr val="accent1"/>
+            </a:effectRef>
+            <a:fontRef idx="minor">
+              <a:schemeClr val="lt1"/>
+            </a:fontRef>
+          </p:style>
+          <p:txBody>
+            <a:bodyPr rtlCol="0" anchor="ctr"/>
+            <a:lstStyle/>
+            <a:p>
+              <a:pPr algn="ctr"/>
+              <a:r>
+                <a:rPr lang="de-DE" dirty="0" err="1"/>
+                <a:t>MicroService</a:t>
+              </a:r>
+              <a:br>
+                <a:rPr lang="de-DE" dirty="0"/>
+              </a:br>
+              <a:r>
+                <a:rPr lang="de-DE" dirty="0" err="1"/>
+                <a:t>person</a:t>
+              </a:r>
+              <a:endParaRPr lang="de-DE" dirty="0"/>
+            </a:p>
+          </p:txBody>
+        </p:sp>
+        <p:sp>
+          <p:nvSpPr>
+            <p:cNvPr id="45" name="Magnetplattenspeicher 44">
+              <a:extLst>
+                <a:ext uri="{FF2B5EF4-FFF2-40B4-BE49-F238E27FC236}">
+                  <a16:creationId xmlns:a16="http://schemas.microsoft.com/office/drawing/2014/main" id="{B014ABC0-DA58-B548-9464-5CEC15ECA332}"/>
+                </a:ext>
+              </a:extLst>
+            </p:cNvPr>
+            <p:cNvSpPr/>
+            <p:nvPr/>
+          </p:nvSpPr>
+          <p:spPr>
+            <a:xfrm>
+              <a:off x="5015442" y="5002225"/>
+              <a:ext cx="649514" cy="702128"/>
+            </a:xfrm>
+            <a:prstGeom prst="flowChartMagneticDisk">
+              <a:avLst/>
+            </a:prstGeom>
+          </p:spPr>
+          <p:style>
+            <a:lnRef idx="2">
+              <a:schemeClr val="accent1">
+                <a:shade val="50000"/>
+              </a:schemeClr>
+            </a:lnRef>
+            <a:fillRef idx="1">
+              <a:schemeClr val="accent1"/>
+            </a:fillRef>
+            <a:effectRef idx="0">
+              <a:schemeClr val="accent1"/>
+            </a:effectRef>
+            <a:fontRef idx="minor">
+              <a:schemeClr val="lt1"/>
+            </a:fontRef>
+          </p:style>
+          <p:txBody>
+            <a:bodyPr rtlCol="0" anchor="ctr"/>
+            <a:lstStyle/>
+            <a:p>
+              <a:pPr algn="ctr"/>
+              <a:endParaRPr lang="de-DE"/>
+            </a:p>
+          </p:txBody>
+        </p:sp>
+        <p:sp>
+          <p:nvSpPr>
+            <p:cNvPr id="62" name="Abgerundetes Rechteck 61">
+              <a:extLst>
+                <a:ext uri="{FF2B5EF4-FFF2-40B4-BE49-F238E27FC236}">
+                  <a16:creationId xmlns:a16="http://schemas.microsoft.com/office/drawing/2014/main" id="{CC6DBFE9-F260-864A-832C-FC081522D987}"/>
+                </a:ext>
+              </a:extLst>
+            </p:cNvPr>
+            <p:cNvSpPr/>
+            <p:nvPr/>
+          </p:nvSpPr>
+          <p:spPr>
+            <a:xfrm>
+              <a:off x="6396350" y="3523796"/>
+              <a:ext cx="2399581" cy="892629"/>
+            </a:xfrm>
+            <a:prstGeom prst="roundRect">
+              <a:avLst/>
+            </a:prstGeom>
+            <a:solidFill>
+              <a:schemeClr val="accent2">
+                <a:lumMod val="60000"/>
+                <a:lumOff val="40000"/>
+              </a:schemeClr>
+            </a:solidFill>
+          </p:spPr>
+          <p:style>
+            <a:lnRef idx="2">
+              <a:schemeClr val="accent1">
+                <a:shade val="50000"/>
+              </a:schemeClr>
+            </a:lnRef>
+            <a:fillRef idx="1">
+              <a:schemeClr val="accent1"/>
+            </a:fillRef>
+            <a:effectRef idx="0">
+              <a:schemeClr val="accent1"/>
+            </a:effectRef>
+            <a:fontRef idx="minor">
+              <a:schemeClr val="lt1"/>
+            </a:fontRef>
+          </p:style>
+          <p:txBody>
+            <a:bodyPr rtlCol="0" anchor="ctr"/>
+            <a:lstStyle/>
+            <a:p>
+              <a:pPr algn="ctr"/>
+              <a:r>
+                <a:rPr lang="de-DE" dirty="0" err="1"/>
+                <a:t>MicroService</a:t>
+              </a:r>
+              <a:br>
+                <a:rPr lang="de-DE" dirty="0"/>
+              </a:br>
+              <a:r>
+                <a:rPr lang="de-DE" dirty="0" err="1"/>
+                <a:t>auftrag</a:t>
+              </a:r>
+              <a:endParaRPr lang="de-DE" dirty="0"/>
+            </a:p>
+          </p:txBody>
+        </p:sp>
+        <p:cxnSp>
+          <p:nvCxnSpPr>
+            <p:cNvPr id="63" name="Gerade Verbindung mit Pfeil 62">
+              <a:extLst>
+                <a:ext uri="{FF2B5EF4-FFF2-40B4-BE49-F238E27FC236}">
+                  <a16:creationId xmlns:a16="http://schemas.microsoft.com/office/drawing/2014/main" id="{EF77C060-69E3-224E-952B-B54E2A6A27D9}"/>
+                </a:ext>
+              </a:extLst>
+            </p:cNvPr>
+            <p:cNvCxnSpPr>
+              <a:cxnSpLocks/>
+              <a:stCxn id="5" idx="2"/>
+              <a:endCxn id="62" idx="0"/>
+            </p:cNvCxnSpPr>
+            <p:nvPr/>
+          </p:nvCxnSpPr>
+          <p:spPr>
+            <a:xfrm>
+              <a:off x="5900965" y="2782284"/>
+              <a:ext cx="1695176" cy="741512"/>
+            </a:xfrm>
+            <a:prstGeom prst="straightConnector1">
+              <a:avLst/>
+            </a:prstGeom>
+            <a:ln w="38100">
+              <a:tailEnd type="triangle"/>
+            </a:ln>
+          </p:spPr>
+          <p:style>
+            <a:lnRef idx="1">
+              <a:schemeClr val="accent1"/>
+            </a:lnRef>
+            <a:fillRef idx="0">
+              <a:schemeClr val="accent1"/>
+            </a:fillRef>
+            <a:effectRef idx="0">
+              <a:schemeClr val="accent1"/>
+            </a:effectRef>
+            <a:fontRef idx="minor">
+              <a:schemeClr val="tx1"/>
+            </a:fontRef>
+          </p:style>
+        </p:cxnSp>
+        <p:cxnSp>
+          <p:nvCxnSpPr>
+            <p:cNvPr id="67" name="Gerade Verbindung mit Pfeil 66">
+              <a:extLst>
+                <a:ext uri="{FF2B5EF4-FFF2-40B4-BE49-F238E27FC236}">
+                  <a16:creationId xmlns:a16="http://schemas.microsoft.com/office/drawing/2014/main" id="{0C5BEB8E-92C2-E341-BC63-5A4A0C09CCE9}"/>
+                </a:ext>
+              </a:extLst>
+            </p:cNvPr>
+            <p:cNvCxnSpPr>
+              <a:cxnSpLocks/>
+              <a:stCxn id="62" idx="2"/>
+              <a:endCxn id="28" idx="1"/>
+            </p:cNvCxnSpPr>
+            <p:nvPr/>
+          </p:nvCxnSpPr>
+          <p:spPr>
+            <a:xfrm>
+              <a:off x="7596141" y="4416425"/>
+              <a:ext cx="1012645" cy="271391"/>
+            </a:xfrm>
+            <a:prstGeom prst="straightConnector1">
+              <a:avLst/>
+            </a:prstGeom>
+            <a:ln w="38100">
+              <a:tailEnd type="triangle"/>
+            </a:ln>
+          </p:spPr>
+          <p:style>
+            <a:lnRef idx="1">
+              <a:schemeClr val="accent1"/>
+            </a:lnRef>
+            <a:fillRef idx="0">
+              <a:schemeClr val="accent1"/>
+            </a:fillRef>
+            <a:effectRef idx="0">
+              <a:schemeClr val="accent1"/>
+            </a:effectRef>
+            <a:fontRef idx="minor">
+              <a:schemeClr val="tx1"/>
+            </a:fontRef>
+          </p:style>
+        </p:cxnSp>
+      </p:grpSp>
     </p:spTree>
     <p:extLst>
       <p:ext uri="{BB962C8B-B14F-4D97-AF65-F5344CB8AC3E}">
         <p14:creationId xmlns:p14="http://schemas.microsoft.com/office/powerpoint/2010/main" val="1330920125"/>
-      </p:ext>
-    </p:extLst>
-  </p:cSld>
-  <p:clrMapOvr>
-    <a:masterClrMapping/>
-  </p:clrMapOvr>
-</p:sld>
-</file>
-
-<file path=ppt/slides/slide5.xml><?xml version="1.0" encoding="utf-8"?>
-<p:sld xmlns:a="http://schemas.openxmlformats.org/drawingml/2006/main" xmlns:r="http://schemas.openxmlformats.org/officeDocument/2006/relationships" xmlns:p="http://schemas.openxmlformats.org/presentationml/2006/main">
-  <p:cSld>
-    <p:spTree>
-      <p:nvGrpSpPr>
-        <p:cNvPr id="1" name=""/>
-        <p:cNvGrpSpPr/>
-        <p:nvPr/>
-      </p:nvGrpSpPr>
-      <p:grpSpPr>
-        <a:xfrm>
-          <a:off x="0" y="0"/>
-          <a:ext cx="0" cy="0"/>
-          <a:chOff x="0" y="0"/>
-          <a:chExt cx="0" cy="0"/>
-        </a:xfrm>
-      </p:grpSpPr>
-      <p:sp>
-        <p:nvSpPr>
-          <p:cNvPr id="4" name="Abgerundetes Rechteck 3">
-            <a:extLst>
-              <a:ext uri="{FF2B5EF4-FFF2-40B4-BE49-F238E27FC236}">
-                <a16:creationId xmlns:a16="http://schemas.microsoft.com/office/drawing/2014/main" id="{79BC28D4-3EF9-804B-82DA-C260F687E32D}"/>
-              </a:ext>
-            </a:extLst>
-          </p:cNvPr>
-          <p:cNvSpPr/>
-          <p:nvPr/>
-        </p:nvSpPr>
-        <p:spPr>
-          <a:xfrm>
-            <a:off x="3646715" y="337456"/>
-            <a:ext cx="4637314" cy="794658"/>
-          </a:xfrm>
-          <a:prstGeom prst="roundRect">
-            <a:avLst/>
-          </a:prstGeom>
-        </p:spPr>
-        <p:style>
-          <a:lnRef idx="2">
-            <a:schemeClr val="accent1">
-              <a:shade val="50000"/>
-            </a:schemeClr>
-          </a:lnRef>
-          <a:fillRef idx="1">
-            <a:schemeClr val="accent1"/>
-          </a:fillRef>
-          <a:effectRef idx="0">
-            <a:schemeClr val="accent1"/>
-          </a:effectRef>
-          <a:fontRef idx="minor">
-            <a:schemeClr val="lt1"/>
-          </a:fontRef>
-        </p:style>
-        <p:txBody>
-          <a:bodyPr rtlCol="0" anchor="ctr"/>
-          <a:lstStyle/>
-          <a:p>
-            <a:pPr algn="ctr"/>
-            <a:r>
-              <a:rPr lang="de-DE" dirty="0"/>
-              <a:t>Browser</a:t>
-            </a:r>
-            <a:br>
-              <a:rPr lang="de-DE" dirty="0"/>
-            </a:br>
-            <a:r>
-              <a:rPr lang="de-DE" dirty="0"/>
-              <a:t>HTML</a:t>
-            </a:r>
-          </a:p>
-        </p:txBody>
-      </p:sp>
-      <p:sp>
-        <p:nvSpPr>
-          <p:cNvPr id="5" name="Abgerundetes Rechteck 4">
-            <a:extLst>
-              <a:ext uri="{FF2B5EF4-FFF2-40B4-BE49-F238E27FC236}">
-                <a16:creationId xmlns:a16="http://schemas.microsoft.com/office/drawing/2014/main" id="{C9E7511D-A024-5043-B96A-C26F19AAB85E}"/>
-              </a:ext>
-            </a:extLst>
-          </p:cNvPr>
-          <p:cNvSpPr/>
-          <p:nvPr/>
-        </p:nvSpPr>
-        <p:spPr>
-          <a:xfrm>
-            <a:off x="4597879" y="1889655"/>
-            <a:ext cx="2606171" cy="892629"/>
-          </a:xfrm>
-          <a:prstGeom prst="roundRect">
-            <a:avLst/>
-          </a:prstGeom>
-          <a:solidFill>
-            <a:schemeClr val="accent2">
-              <a:lumMod val="60000"/>
-              <a:lumOff val="40000"/>
-            </a:schemeClr>
-          </a:solidFill>
-        </p:spPr>
-        <p:style>
-          <a:lnRef idx="2">
-            <a:schemeClr val="accent1">
-              <a:shade val="50000"/>
-            </a:schemeClr>
-          </a:lnRef>
-          <a:fillRef idx="1">
-            <a:schemeClr val="accent1"/>
-          </a:fillRef>
-          <a:effectRef idx="0">
-            <a:schemeClr val="accent1"/>
-          </a:effectRef>
-          <a:fontRef idx="minor">
-            <a:schemeClr val="lt1"/>
-          </a:fontRef>
-        </p:style>
-        <p:txBody>
-          <a:bodyPr rtlCol="0" anchor="ctr"/>
-          <a:lstStyle/>
-          <a:p>
-            <a:pPr algn="ctr"/>
-            <a:r>
-              <a:rPr lang="de-DE" dirty="0" err="1"/>
-              <a:t>MicroService</a:t>
-            </a:r>
-            <a:br>
-              <a:rPr lang="de-DE" dirty="0"/>
-            </a:br>
-            <a:r>
-              <a:rPr lang="de-DE" dirty="0" err="1"/>
-              <a:t>shop</a:t>
-            </a:r>
-            <a:endParaRPr lang="de-DE" dirty="0"/>
-          </a:p>
-        </p:txBody>
-      </p:sp>
-      <p:cxnSp>
-        <p:nvCxnSpPr>
-          <p:cNvPr id="7" name="Gerade Verbindung mit Pfeil 6">
-            <a:extLst>
-              <a:ext uri="{FF2B5EF4-FFF2-40B4-BE49-F238E27FC236}">
-                <a16:creationId xmlns:a16="http://schemas.microsoft.com/office/drawing/2014/main" id="{7EA12433-B077-C346-B199-60BE14EA375F}"/>
-              </a:ext>
-            </a:extLst>
-          </p:cNvPr>
-          <p:cNvCxnSpPr>
-            <a:cxnSpLocks/>
-            <a:stCxn id="4" idx="2"/>
-            <a:endCxn id="5" idx="0"/>
-          </p:cNvCxnSpPr>
-          <p:nvPr/>
-        </p:nvCxnSpPr>
-        <p:spPr>
-          <a:xfrm flipH="1">
-            <a:off x="5900965" y="1132114"/>
-            <a:ext cx="64407" cy="757541"/>
-          </a:xfrm>
-          <a:prstGeom prst="straightConnector1">
-            <a:avLst/>
-          </a:prstGeom>
-          <a:ln w="38100">
-            <a:tailEnd type="triangle"/>
-          </a:ln>
-        </p:spPr>
-        <p:style>
-          <a:lnRef idx="1">
-            <a:schemeClr val="accent1"/>
-          </a:lnRef>
-          <a:fillRef idx="0">
-            <a:schemeClr val="accent1"/>
-          </a:fillRef>
-          <a:effectRef idx="0">
-            <a:schemeClr val="accent1"/>
-          </a:effectRef>
-          <a:fontRef idx="minor">
-            <a:schemeClr val="tx1"/>
-          </a:fontRef>
-        </p:style>
-      </p:cxnSp>
-      <p:cxnSp>
-        <p:nvCxnSpPr>
-          <p:cNvPr id="13" name="Gerade Verbindung mit Pfeil 12">
-            <a:extLst>
-              <a:ext uri="{FF2B5EF4-FFF2-40B4-BE49-F238E27FC236}">
-                <a16:creationId xmlns:a16="http://schemas.microsoft.com/office/drawing/2014/main" id="{38590E46-A719-2441-90F2-D877DA52215C}"/>
-              </a:ext>
-            </a:extLst>
-          </p:cNvPr>
-          <p:cNvCxnSpPr>
-            <a:cxnSpLocks/>
-            <a:stCxn id="5" idx="2"/>
-            <a:endCxn id="36" idx="0"/>
-          </p:cNvCxnSpPr>
-          <p:nvPr/>
-        </p:nvCxnSpPr>
-        <p:spPr>
-          <a:xfrm flipH="1">
-            <a:off x="4095889" y="2782284"/>
-            <a:ext cx="1805076" cy="792926"/>
-          </a:xfrm>
-          <a:prstGeom prst="straightConnector1">
-            <a:avLst/>
-          </a:prstGeom>
-          <a:ln w="38100">
-            <a:tailEnd type="triangle"/>
-          </a:ln>
-        </p:spPr>
-        <p:style>
-          <a:lnRef idx="1">
-            <a:schemeClr val="accent1"/>
-          </a:lnRef>
-          <a:fillRef idx="0">
-            <a:schemeClr val="accent1"/>
-          </a:fillRef>
-          <a:effectRef idx="0">
-            <a:schemeClr val="accent1"/>
-          </a:effectRef>
-          <a:fontRef idx="minor">
-            <a:schemeClr val="tx1"/>
-          </a:fontRef>
-        </p:style>
-      </p:cxnSp>
-      <p:sp>
-        <p:nvSpPr>
-          <p:cNvPr id="28" name="Magnetplattenspeicher 27">
-            <a:extLst>
-              <a:ext uri="{FF2B5EF4-FFF2-40B4-BE49-F238E27FC236}">
-                <a16:creationId xmlns:a16="http://schemas.microsoft.com/office/drawing/2014/main" id="{9343B73B-6448-4443-B86D-6669D318D430}"/>
-              </a:ext>
-            </a:extLst>
-          </p:cNvPr>
-          <p:cNvSpPr/>
-          <p:nvPr/>
-        </p:nvSpPr>
-        <p:spPr>
-          <a:xfrm>
-            <a:off x="8284029" y="4687816"/>
-            <a:ext cx="649514" cy="702128"/>
-          </a:xfrm>
-          <a:prstGeom prst="flowChartMagneticDisk">
-            <a:avLst/>
-          </a:prstGeom>
-        </p:spPr>
-        <p:style>
-          <a:lnRef idx="2">
-            <a:schemeClr val="accent1">
-              <a:shade val="50000"/>
-            </a:schemeClr>
-          </a:lnRef>
-          <a:fillRef idx="1">
-            <a:schemeClr val="accent1"/>
-          </a:fillRef>
-          <a:effectRef idx="0">
-            <a:schemeClr val="accent1"/>
-          </a:effectRef>
-          <a:fontRef idx="minor">
-            <a:schemeClr val="lt1"/>
-          </a:fontRef>
-        </p:style>
-        <p:txBody>
-          <a:bodyPr rtlCol="0" anchor="ctr"/>
-          <a:lstStyle/>
-          <a:p>
-            <a:pPr algn="ctr"/>
-            <a:endParaRPr lang="de-DE"/>
-          </a:p>
-        </p:txBody>
-      </p:sp>
-      <p:cxnSp>
-        <p:nvCxnSpPr>
-          <p:cNvPr id="35" name="Gerade Verbindung mit Pfeil 34">
-            <a:extLst>
-              <a:ext uri="{FF2B5EF4-FFF2-40B4-BE49-F238E27FC236}">
-                <a16:creationId xmlns:a16="http://schemas.microsoft.com/office/drawing/2014/main" id="{F60B072C-6DFB-7542-A5BF-A3FCB3709BF7}"/>
-              </a:ext>
-            </a:extLst>
-          </p:cNvPr>
-          <p:cNvCxnSpPr>
-            <a:cxnSpLocks/>
-            <a:stCxn id="36" idx="2"/>
-            <a:endCxn id="45" idx="1"/>
-          </p:cNvCxnSpPr>
-          <p:nvPr/>
-        </p:nvCxnSpPr>
-        <p:spPr>
-          <a:xfrm>
-            <a:off x="4095889" y="4467839"/>
-            <a:ext cx="1244310" cy="534386"/>
-          </a:xfrm>
-          <a:prstGeom prst="straightConnector1">
-            <a:avLst/>
-          </a:prstGeom>
-          <a:ln w="38100">
-            <a:tailEnd type="triangle"/>
-          </a:ln>
-        </p:spPr>
-        <p:style>
-          <a:lnRef idx="1">
-            <a:schemeClr val="accent1"/>
-          </a:lnRef>
-          <a:fillRef idx="0">
-            <a:schemeClr val="accent1"/>
-          </a:fillRef>
-          <a:effectRef idx="0">
-            <a:schemeClr val="accent1"/>
-          </a:effectRef>
-          <a:fontRef idx="minor">
-            <a:schemeClr val="tx1"/>
-          </a:fontRef>
-        </p:style>
-      </p:cxnSp>
-      <p:sp>
-        <p:nvSpPr>
-          <p:cNvPr id="43" name="Abgerundetes Rechteck 42">
-            <a:extLst>
-              <a:ext uri="{FF2B5EF4-FFF2-40B4-BE49-F238E27FC236}">
-                <a16:creationId xmlns:a16="http://schemas.microsoft.com/office/drawing/2014/main" id="{FC74CC00-0FC9-9F47-80DD-220CFFFBDC7A}"/>
-              </a:ext>
-            </a:extLst>
-          </p:cNvPr>
-          <p:cNvSpPr/>
-          <p:nvPr/>
-        </p:nvSpPr>
-        <p:spPr>
-          <a:xfrm>
-            <a:off x="984849" y="1738538"/>
-            <a:ext cx="2106591" cy="892629"/>
-          </a:xfrm>
-          <a:prstGeom prst="roundRect">
-            <a:avLst/>
-          </a:prstGeom>
-          <a:solidFill>
-            <a:schemeClr val="accent2">
-              <a:lumMod val="60000"/>
-              <a:lumOff val="40000"/>
-            </a:schemeClr>
-          </a:solidFill>
-        </p:spPr>
-        <p:style>
-          <a:lnRef idx="2">
-            <a:schemeClr val="accent1">
-              <a:shade val="50000"/>
-            </a:schemeClr>
-          </a:lnRef>
-          <a:fillRef idx="1">
-            <a:schemeClr val="accent1"/>
-          </a:fillRef>
-          <a:effectRef idx="0">
-            <a:schemeClr val="accent1"/>
-          </a:effectRef>
-          <a:fontRef idx="minor">
-            <a:schemeClr val="lt1"/>
-          </a:fontRef>
-        </p:style>
-        <p:txBody>
-          <a:bodyPr rtlCol="0" anchor="ctr"/>
-          <a:lstStyle/>
-          <a:p>
-            <a:pPr algn="ctr"/>
-            <a:r>
-              <a:rPr lang="de-DE" dirty="0" err="1"/>
-              <a:t>WebServer</a:t>
-            </a:r>
-            <a:endParaRPr lang="de-DE" dirty="0"/>
-          </a:p>
-        </p:txBody>
-      </p:sp>
-      <p:cxnSp>
-        <p:nvCxnSpPr>
-          <p:cNvPr id="44" name="Gerade Verbindung mit Pfeil 43">
-            <a:extLst>
-              <a:ext uri="{FF2B5EF4-FFF2-40B4-BE49-F238E27FC236}">
-                <a16:creationId xmlns:a16="http://schemas.microsoft.com/office/drawing/2014/main" id="{30CB8BCD-2332-9548-902D-CFD0570A4897}"/>
-              </a:ext>
-            </a:extLst>
-          </p:cNvPr>
-          <p:cNvCxnSpPr>
-            <a:cxnSpLocks/>
-            <a:stCxn id="4" idx="2"/>
-            <a:endCxn id="43" idx="0"/>
-          </p:cNvCxnSpPr>
-          <p:nvPr/>
-        </p:nvCxnSpPr>
-        <p:spPr>
-          <a:xfrm flipH="1">
-            <a:off x="2038145" y="1132114"/>
-            <a:ext cx="3927227" cy="606424"/>
-          </a:xfrm>
-          <a:prstGeom prst="straightConnector1">
-            <a:avLst/>
-          </a:prstGeom>
-          <a:ln w="38100">
-            <a:tailEnd type="triangle"/>
-          </a:ln>
-        </p:spPr>
-        <p:style>
-          <a:lnRef idx="1">
-            <a:schemeClr val="accent1"/>
-          </a:lnRef>
-          <a:fillRef idx="0">
-            <a:schemeClr val="accent1"/>
-          </a:fillRef>
-          <a:effectRef idx="0">
-            <a:schemeClr val="accent1"/>
-          </a:effectRef>
-          <a:fontRef idx="minor">
-            <a:schemeClr val="tx1"/>
-          </a:fontRef>
-        </p:style>
-      </p:cxnSp>
-      <p:sp>
-        <p:nvSpPr>
-          <p:cNvPr id="36" name="Abgerundetes Rechteck 35">
-            <a:extLst>
-              <a:ext uri="{FF2B5EF4-FFF2-40B4-BE49-F238E27FC236}">
-                <a16:creationId xmlns:a16="http://schemas.microsoft.com/office/drawing/2014/main" id="{54D430FF-2891-4B4D-92F9-4E4825667ACF}"/>
-              </a:ext>
-            </a:extLst>
-          </p:cNvPr>
-          <p:cNvSpPr/>
-          <p:nvPr/>
-        </p:nvSpPr>
-        <p:spPr>
-          <a:xfrm>
-            <a:off x="2896098" y="3575210"/>
-            <a:ext cx="2399581" cy="892629"/>
-          </a:xfrm>
-          <a:prstGeom prst="roundRect">
-            <a:avLst/>
-          </a:prstGeom>
-          <a:solidFill>
-            <a:schemeClr val="accent2">
-              <a:lumMod val="60000"/>
-              <a:lumOff val="40000"/>
-            </a:schemeClr>
-          </a:solidFill>
-        </p:spPr>
-        <p:style>
-          <a:lnRef idx="2">
-            <a:schemeClr val="accent1">
-              <a:shade val="50000"/>
-            </a:schemeClr>
-          </a:lnRef>
-          <a:fillRef idx="1">
-            <a:schemeClr val="accent1"/>
-          </a:fillRef>
-          <a:effectRef idx="0">
-            <a:schemeClr val="accent1"/>
-          </a:effectRef>
-          <a:fontRef idx="minor">
-            <a:schemeClr val="lt1"/>
-          </a:fontRef>
-        </p:style>
-        <p:txBody>
-          <a:bodyPr rtlCol="0" anchor="ctr"/>
-          <a:lstStyle/>
-          <a:p>
-            <a:pPr algn="ctr"/>
-            <a:r>
-              <a:rPr lang="de-DE" dirty="0" err="1"/>
-              <a:t>MicroService</a:t>
-            </a:r>
-            <a:br>
-              <a:rPr lang="de-DE" dirty="0"/>
-            </a:br>
-            <a:r>
-              <a:rPr lang="de-DE" dirty="0" err="1"/>
-              <a:t>person</a:t>
-            </a:r>
-            <a:endParaRPr lang="de-DE" dirty="0"/>
-          </a:p>
-        </p:txBody>
-      </p:sp>
-      <p:sp>
-        <p:nvSpPr>
-          <p:cNvPr id="45" name="Magnetplattenspeicher 44">
-            <a:extLst>
-              <a:ext uri="{FF2B5EF4-FFF2-40B4-BE49-F238E27FC236}">
-                <a16:creationId xmlns:a16="http://schemas.microsoft.com/office/drawing/2014/main" id="{B014ABC0-DA58-B548-9464-5CEC15ECA332}"/>
-              </a:ext>
-            </a:extLst>
-          </p:cNvPr>
-          <p:cNvSpPr/>
-          <p:nvPr/>
-        </p:nvSpPr>
-        <p:spPr>
-          <a:xfrm>
-            <a:off x="5015442" y="5002225"/>
-            <a:ext cx="649514" cy="702128"/>
-          </a:xfrm>
-          <a:prstGeom prst="flowChartMagneticDisk">
-            <a:avLst/>
-          </a:prstGeom>
-        </p:spPr>
-        <p:style>
-          <a:lnRef idx="2">
-            <a:schemeClr val="accent1">
-              <a:shade val="50000"/>
-            </a:schemeClr>
-          </a:lnRef>
-          <a:fillRef idx="1">
-            <a:schemeClr val="accent1"/>
-          </a:fillRef>
-          <a:effectRef idx="0">
-            <a:schemeClr val="accent1"/>
-          </a:effectRef>
-          <a:fontRef idx="minor">
-            <a:schemeClr val="lt1"/>
-          </a:fontRef>
-        </p:style>
-        <p:txBody>
-          <a:bodyPr rtlCol="0" anchor="ctr"/>
-          <a:lstStyle/>
-          <a:p>
-            <a:pPr algn="ctr"/>
-            <a:endParaRPr lang="de-DE"/>
-          </a:p>
-        </p:txBody>
-      </p:sp>
-      <p:sp>
-        <p:nvSpPr>
-          <p:cNvPr id="62" name="Abgerundetes Rechteck 61">
-            <a:extLst>
-              <a:ext uri="{FF2B5EF4-FFF2-40B4-BE49-F238E27FC236}">
-                <a16:creationId xmlns:a16="http://schemas.microsoft.com/office/drawing/2014/main" id="{CC6DBFE9-F260-864A-832C-FC081522D987}"/>
-              </a:ext>
-            </a:extLst>
-          </p:cNvPr>
-          <p:cNvSpPr/>
-          <p:nvPr/>
-        </p:nvSpPr>
-        <p:spPr>
-          <a:xfrm>
-            <a:off x="6396350" y="3523796"/>
-            <a:ext cx="2399581" cy="892629"/>
-          </a:xfrm>
-          <a:prstGeom prst="roundRect">
-            <a:avLst/>
-          </a:prstGeom>
-          <a:solidFill>
-            <a:schemeClr val="accent2">
-              <a:lumMod val="60000"/>
-              <a:lumOff val="40000"/>
-            </a:schemeClr>
-          </a:solidFill>
-        </p:spPr>
-        <p:style>
-          <a:lnRef idx="2">
-            <a:schemeClr val="accent1">
-              <a:shade val="50000"/>
-            </a:schemeClr>
-          </a:lnRef>
-          <a:fillRef idx="1">
-            <a:schemeClr val="accent1"/>
-          </a:fillRef>
-          <a:effectRef idx="0">
-            <a:schemeClr val="accent1"/>
-          </a:effectRef>
-          <a:fontRef idx="minor">
-            <a:schemeClr val="lt1"/>
-          </a:fontRef>
-        </p:style>
-        <p:txBody>
-          <a:bodyPr rtlCol="0" anchor="ctr"/>
-          <a:lstStyle/>
-          <a:p>
-            <a:pPr algn="ctr"/>
-            <a:r>
-              <a:rPr lang="de-DE" dirty="0" err="1"/>
-              <a:t>MicroService</a:t>
-            </a:r>
-            <a:br>
-              <a:rPr lang="de-DE" dirty="0"/>
-            </a:br>
-            <a:r>
-              <a:rPr lang="de-DE" dirty="0" err="1"/>
-              <a:t>auftrag</a:t>
-            </a:r>
-            <a:endParaRPr lang="de-DE" dirty="0"/>
-          </a:p>
-        </p:txBody>
-      </p:sp>
-      <p:cxnSp>
-        <p:nvCxnSpPr>
-          <p:cNvPr id="63" name="Gerade Verbindung mit Pfeil 62">
-            <a:extLst>
-              <a:ext uri="{FF2B5EF4-FFF2-40B4-BE49-F238E27FC236}">
-                <a16:creationId xmlns:a16="http://schemas.microsoft.com/office/drawing/2014/main" id="{EF77C060-69E3-224E-952B-B54E2A6A27D9}"/>
-              </a:ext>
-            </a:extLst>
-          </p:cNvPr>
-          <p:cNvCxnSpPr>
-            <a:cxnSpLocks/>
-            <a:stCxn id="5" idx="2"/>
-            <a:endCxn id="62" idx="0"/>
-          </p:cNvCxnSpPr>
-          <p:nvPr/>
-        </p:nvCxnSpPr>
-        <p:spPr>
-          <a:xfrm>
-            <a:off x="5900965" y="2782284"/>
-            <a:ext cx="1695176" cy="741512"/>
-          </a:xfrm>
-          <a:prstGeom prst="straightConnector1">
-            <a:avLst/>
-          </a:prstGeom>
-          <a:ln w="38100">
-            <a:tailEnd type="triangle"/>
-          </a:ln>
-        </p:spPr>
-        <p:style>
-          <a:lnRef idx="1">
-            <a:schemeClr val="accent1"/>
-          </a:lnRef>
-          <a:fillRef idx="0">
-            <a:schemeClr val="accent1"/>
-          </a:fillRef>
-          <a:effectRef idx="0">
-            <a:schemeClr val="accent1"/>
-          </a:effectRef>
-          <a:fontRef idx="minor">
-            <a:schemeClr val="tx1"/>
-          </a:fontRef>
-        </p:style>
-      </p:cxnSp>
-      <p:cxnSp>
-        <p:nvCxnSpPr>
-          <p:cNvPr id="67" name="Gerade Verbindung mit Pfeil 66">
-            <a:extLst>
-              <a:ext uri="{FF2B5EF4-FFF2-40B4-BE49-F238E27FC236}">
-                <a16:creationId xmlns:a16="http://schemas.microsoft.com/office/drawing/2014/main" id="{0C5BEB8E-92C2-E341-BC63-5A4A0C09CCE9}"/>
-              </a:ext>
-            </a:extLst>
-          </p:cNvPr>
-          <p:cNvCxnSpPr>
-            <a:cxnSpLocks/>
-            <a:stCxn id="62" idx="2"/>
-            <a:endCxn id="28" idx="1"/>
-          </p:cNvCxnSpPr>
-          <p:nvPr/>
-        </p:nvCxnSpPr>
-        <p:spPr>
-          <a:xfrm>
-            <a:off x="7596141" y="4416425"/>
-            <a:ext cx="1012645" cy="271391"/>
-          </a:xfrm>
-          <a:prstGeom prst="straightConnector1">
-            <a:avLst/>
-          </a:prstGeom>
-          <a:ln w="38100">
-            <a:tailEnd type="triangle"/>
-          </a:ln>
-        </p:spPr>
-        <p:style>
-          <a:lnRef idx="1">
-            <a:schemeClr val="accent1"/>
-          </a:lnRef>
-          <a:fillRef idx="0">
-            <a:schemeClr val="accent1"/>
-          </a:fillRef>
-          <a:effectRef idx="0">
-            <a:schemeClr val="accent1"/>
-          </a:effectRef>
-          <a:fontRef idx="minor">
-            <a:schemeClr val="tx1"/>
-          </a:fontRef>
-        </p:style>
-      </p:cxnSp>
-      <p:sp>
-        <p:nvSpPr>
-          <p:cNvPr id="2" name="Oval 1">
-            <a:extLst>
-              <a:ext uri="{FF2B5EF4-FFF2-40B4-BE49-F238E27FC236}">
-                <a16:creationId xmlns:a16="http://schemas.microsoft.com/office/drawing/2014/main" id="{D567266D-5A62-92D5-C261-EC3E38B2E50D}"/>
-              </a:ext>
-            </a:extLst>
-          </p:cNvPr>
-          <p:cNvSpPr/>
-          <p:nvPr/>
-        </p:nvSpPr>
-        <p:spPr>
-          <a:xfrm>
-            <a:off x="5664956" y="1630392"/>
-            <a:ext cx="502931" cy="457200"/>
-          </a:xfrm>
-          <a:prstGeom prst="ellipse">
-            <a:avLst/>
-          </a:prstGeom>
-          <a:solidFill>
-            <a:srgbClr val="FF0000">
-              <a:alpha val="21000"/>
-            </a:srgbClr>
-          </a:solidFill>
-        </p:spPr>
-        <p:style>
-          <a:lnRef idx="2">
-            <a:schemeClr val="accent1">
-              <a:shade val="50000"/>
-            </a:schemeClr>
-          </a:lnRef>
-          <a:fillRef idx="1">
-            <a:schemeClr val="accent1"/>
-          </a:fillRef>
-          <a:effectRef idx="0">
-            <a:schemeClr val="accent1"/>
-          </a:effectRef>
-          <a:fontRef idx="minor">
-            <a:schemeClr val="lt1"/>
-          </a:fontRef>
-        </p:style>
-        <p:txBody>
-          <a:bodyPr rtlCol="0" anchor="ctr"/>
-          <a:lstStyle/>
-          <a:p>
-            <a:pPr algn="ctr"/>
-            <a:endParaRPr lang="de-DE"/>
-          </a:p>
-        </p:txBody>
-      </p:sp>
-    </p:spTree>
-    <p:extLst>
-      <p:ext uri="{BB962C8B-B14F-4D97-AF65-F5344CB8AC3E}">
-        <p14:creationId xmlns:p14="http://schemas.microsoft.com/office/powerpoint/2010/main" val="705747684"/>
-      </p:ext>
-    </p:extLst>
-  </p:cSld>
-  <p:clrMapOvr>
-    <a:masterClrMapping/>
-  </p:clrMapOvr>
-</p:sld>
-</file>
-
-<file path=ppt/slides/slide6.xml><?xml version="1.0" encoding="utf-8"?>
-<p:sld xmlns:a="http://schemas.openxmlformats.org/drawingml/2006/main" xmlns:r="http://schemas.openxmlformats.org/officeDocument/2006/relationships" xmlns:p="http://schemas.openxmlformats.org/presentationml/2006/main">
-  <p:cSld>
-    <p:spTree>
-      <p:nvGrpSpPr>
-        <p:cNvPr id="1" name=""/>
-        <p:cNvGrpSpPr/>
-        <p:nvPr/>
-      </p:nvGrpSpPr>
-      <p:grpSpPr>
-        <a:xfrm>
-          <a:off x="0" y="0"/>
-          <a:ext cx="0" cy="0"/>
-          <a:chOff x="0" y="0"/>
-          <a:chExt cx="0" cy="0"/>
-        </a:xfrm>
-      </p:grpSpPr>
-      <p:sp>
-        <p:nvSpPr>
-          <p:cNvPr id="4" name="Abgerundetes Rechteck 3">
-            <a:extLst>
-              <a:ext uri="{FF2B5EF4-FFF2-40B4-BE49-F238E27FC236}">
-                <a16:creationId xmlns:a16="http://schemas.microsoft.com/office/drawing/2014/main" id="{79BC28D4-3EF9-804B-82DA-C260F687E32D}"/>
-              </a:ext>
-            </a:extLst>
-          </p:cNvPr>
-          <p:cNvSpPr/>
-          <p:nvPr/>
-        </p:nvSpPr>
-        <p:spPr>
-          <a:xfrm>
-            <a:off x="3646715" y="337456"/>
-            <a:ext cx="4637314" cy="794658"/>
-          </a:xfrm>
-          <a:prstGeom prst="roundRect">
-            <a:avLst/>
-          </a:prstGeom>
-        </p:spPr>
-        <p:style>
-          <a:lnRef idx="2">
-            <a:schemeClr val="accent1">
-              <a:shade val="50000"/>
-            </a:schemeClr>
-          </a:lnRef>
-          <a:fillRef idx="1">
-            <a:schemeClr val="accent1"/>
-          </a:fillRef>
-          <a:effectRef idx="0">
-            <a:schemeClr val="accent1"/>
-          </a:effectRef>
-          <a:fontRef idx="minor">
-            <a:schemeClr val="lt1"/>
-          </a:fontRef>
-        </p:style>
-        <p:txBody>
-          <a:bodyPr rtlCol="0" anchor="ctr"/>
-          <a:lstStyle/>
-          <a:p>
-            <a:pPr algn="ctr"/>
-            <a:r>
-              <a:rPr lang="de-DE" dirty="0"/>
-              <a:t>Browser</a:t>
-            </a:r>
-            <a:br>
-              <a:rPr lang="de-DE" dirty="0"/>
-            </a:br>
-            <a:r>
-              <a:rPr lang="de-DE" dirty="0"/>
-              <a:t>HTML</a:t>
-            </a:r>
-          </a:p>
-        </p:txBody>
-      </p:sp>
-      <p:sp>
-        <p:nvSpPr>
-          <p:cNvPr id="5" name="Abgerundetes Rechteck 4">
-            <a:extLst>
-              <a:ext uri="{FF2B5EF4-FFF2-40B4-BE49-F238E27FC236}">
-                <a16:creationId xmlns:a16="http://schemas.microsoft.com/office/drawing/2014/main" id="{C9E7511D-A024-5043-B96A-C26F19AAB85E}"/>
-              </a:ext>
-            </a:extLst>
-          </p:cNvPr>
-          <p:cNvSpPr/>
-          <p:nvPr/>
-        </p:nvSpPr>
-        <p:spPr>
-          <a:xfrm>
-            <a:off x="4597879" y="1889655"/>
-            <a:ext cx="2606171" cy="892629"/>
-          </a:xfrm>
-          <a:prstGeom prst="roundRect">
-            <a:avLst/>
-          </a:prstGeom>
-          <a:solidFill>
-            <a:schemeClr val="accent2">
-              <a:lumMod val="60000"/>
-              <a:lumOff val="40000"/>
-            </a:schemeClr>
-          </a:solidFill>
-        </p:spPr>
-        <p:style>
-          <a:lnRef idx="2">
-            <a:schemeClr val="accent1">
-              <a:shade val="50000"/>
-            </a:schemeClr>
-          </a:lnRef>
-          <a:fillRef idx="1">
-            <a:schemeClr val="accent1"/>
-          </a:fillRef>
-          <a:effectRef idx="0">
-            <a:schemeClr val="accent1"/>
-          </a:effectRef>
-          <a:fontRef idx="minor">
-            <a:schemeClr val="lt1"/>
-          </a:fontRef>
-        </p:style>
-        <p:txBody>
-          <a:bodyPr rtlCol="0" anchor="ctr"/>
-          <a:lstStyle/>
-          <a:p>
-            <a:pPr algn="ctr"/>
-            <a:r>
-              <a:rPr lang="de-DE" dirty="0" err="1"/>
-              <a:t>MicroService</a:t>
-            </a:r>
-            <a:br>
-              <a:rPr lang="de-DE" dirty="0"/>
-            </a:br>
-            <a:r>
-              <a:rPr lang="de-DE" dirty="0" err="1"/>
-              <a:t>shop</a:t>
-            </a:r>
-            <a:endParaRPr lang="de-DE" dirty="0"/>
-          </a:p>
-        </p:txBody>
-      </p:sp>
-      <p:cxnSp>
-        <p:nvCxnSpPr>
-          <p:cNvPr id="7" name="Gerade Verbindung mit Pfeil 6">
-            <a:extLst>
-              <a:ext uri="{FF2B5EF4-FFF2-40B4-BE49-F238E27FC236}">
-                <a16:creationId xmlns:a16="http://schemas.microsoft.com/office/drawing/2014/main" id="{7EA12433-B077-C346-B199-60BE14EA375F}"/>
-              </a:ext>
-            </a:extLst>
-          </p:cNvPr>
-          <p:cNvCxnSpPr>
-            <a:cxnSpLocks/>
-            <a:stCxn id="4" idx="2"/>
-            <a:endCxn id="5" idx="0"/>
-          </p:cNvCxnSpPr>
-          <p:nvPr/>
-        </p:nvCxnSpPr>
-        <p:spPr>
-          <a:xfrm flipH="1">
-            <a:off x="5900965" y="1132114"/>
-            <a:ext cx="64407" cy="757541"/>
-          </a:xfrm>
-          <a:prstGeom prst="straightConnector1">
-            <a:avLst/>
-          </a:prstGeom>
-          <a:ln w="38100">
-            <a:tailEnd type="triangle"/>
-          </a:ln>
-        </p:spPr>
-        <p:style>
-          <a:lnRef idx="1">
-            <a:schemeClr val="accent1"/>
-          </a:lnRef>
-          <a:fillRef idx="0">
-            <a:schemeClr val="accent1"/>
-          </a:fillRef>
-          <a:effectRef idx="0">
-            <a:schemeClr val="accent1"/>
-          </a:effectRef>
-          <a:fontRef idx="minor">
-            <a:schemeClr val="tx1"/>
-          </a:fontRef>
-        </p:style>
-      </p:cxnSp>
-      <p:cxnSp>
-        <p:nvCxnSpPr>
-          <p:cNvPr id="13" name="Gerade Verbindung mit Pfeil 12">
-            <a:extLst>
-              <a:ext uri="{FF2B5EF4-FFF2-40B4-BE49-F238E27FC236}">
-                <a16:creationId xmlns:a16="http://schemas.microsoft.com/office/drawing/2014/main" id="{38590E46-A719-2441-90F2-D877DA52215C}"/>
-              </a:ext>
-            </a:extLst>
-          </p:cNvPr>
-          <p:cNvCxnSpPr>
-            <a:cxnSpLocks/>
-            <a:stCxn id="5" idx="2"/>
-            <a:endCxn id="36" idx="0"/>
-          </p:cNvCxnSpPr>
-          <p:nvPr/>
-        </p:nvCxnSpPr>
-        <p:spPr>
-          <a:xfrm flipH="1">
-            <a:off x="4095889" y="2782284"/>
-            <a:ext cx="1805076" cy="792926"/>
-          </a:xfrm>
-          <a:prstGeom prst="straightConnector1">
-            <a:avLst/>
-          </a:prstGeom>
-          <a:ln w="38100">
-            <a:tailEnd type="triangle"/>
-          </a:ln>
-        </p:spPr>
-        <p:style>
-          <a:lnRef idx="1">
-            <a:schemeClr val="accent1"/>
-          </a:lnRef>
-          <a:fillRef idx="0">
-            <a:schemeClr val="accent1"/>
-          </a:fillRef>
-          <a:effectRef idx="0">
-            <a:schemeClr val="accent1"/>
-          </a:effectRef>
-          <a:fontRef idx="minor">
-            <a:schemeClr val="tx1"/>
-          </a:fontRef>
-        </p:style>
-      </p:cxnSp>
-      <p:sp>
-        <p:nvSpPr>
-          <p:cNvPr id="28" name="Magnetplattenspeicher 27">
-            <a:extLst>
-              <a:ext uri="{FF2B5EF4-FFF2-40B4-BE49-F238E27FC236}">
-                <a16:creationId xmlns:a16="http://schemas.microsoft.com/office/drawing/2014/main" id="{9343B73B-6448-4443-B86D-6669D318D430}"/>
-              </a:ext>
-            </a:extLst>
-          </p:cNvPr>
-          <p:cNvSpPr/>
-          <p:nvPr/>
-        </p:nvSpPr>
-        <p:spPr>
-          <a:xfrm>
-            <a:off x="8284029" y="4687816"/>
-            <a:ext cx="649514" cy="702128"/>
-          </a:xfrm>
-          <a:prstGeom prst="flowChartMagneticDisk">
-            <a:avLst/>
-          </a:prstGeom>
-        </p:spPr>
-        <p:style>
-          <a:lnRef idx="2">
-            <a:schemeClr val="accent1">
-              <a:shade val="50000"/>
-            </a:schemeClr>
-          </a:lnRef>
-          <a:fillRef idx="1">
-            <a:schemeClr val="accent1"/>
-          </a:fillRef>
-          <a:effectRef idx="0">
-            <a:schemeClr val="accent1"/>
-          </a:effectRef>
-          <a:fontRef idx="minor">
-            <a:schemeClr val="lt1"/>
-          </a:fontRef>
-        </p:style>
-        <p:txBody>
-          <a:bodyPr rtlCol="0" anchor="ctr"/>
-          <a:lstStyle/>
-          <a:p>
-            <a:pPr algn="ctr"/>
-            <a:endParaRPr lang="de-DE"/>
-          </a:p>
-        </p:txBody>
-      </p:sp>
-      <p:cxnSp>
-        <p:nvCxnSpPr>
-          <p:cNvPr id="35" name="Gerade Verbindung mit Pfeil 34">
-            <a:extLst>
-              <a:ext uri="{FF2B5EF4-FFF2-40B4-BE49-F238E27FC236}">
-                <a16:creationId xmlns:a16="http://schemas.microsoft.com/office/drawing/2014/main" id="{F60B072C-6DFB-7542-A5BF-A3FCB3709BF7}"/>
-              </a:ext>
-            </a:extLst>
-          </p:cNvPr>
-          <p:cNvCxnSpPr>
-            <a:cxnSpLocks/>
-            <a:stCxn id="36" idx="2"/>
-            <a:endCxn id="45" idx="1"/>
-          </p:cNvCxnSpPr>
-          <p:nvPr/>
-        </p:nvCxnSpPr>
-        <p:spPr>
-          <a:xfrm>
-            <a:off x="4095889" y="4467839"/>
-            <a:ext cx="1244310" cy="534386"/>
-          </a:xfrm>
-          <a:prstGeom prst="straightConnector1">
-            <a:avLst/>
-          </a:prstGeom>
-          <a:ln w="38100">
-            <a:tailEnd type="triangle"/>
-          </a:ln>
-        </p:spPr>
-        <p:style>
-          <a:lnRef idx="1">
-            <a:schemeClr val="accent1"/>
-          </a:lnRef>
-          <a:fillRef idx="0">
-            <a:schemeClr val="accent1"/>
-          </a:fillRef>
-          <a:effectRef idx="0">
-            <a:schemeClr val="accent1"/>
-          </a:effectRef>
-          <a:fontRef idx="minor">
-            <a:schemeClr val="tx1"/>
-          </a:fontRef>
-        </p:style>
-      </p:cxnSp>
-      <p:sp>
-        <p:nvSpPr>
-          <p:cNvPr id="43" name="Abgerundetes Rechteck 42">
-            <a:extLst>
-              <a:ext uri="{FF2B5EF4-FFF2-40B4-BE49-F238E27FC236}">
-                <a16:creationId xmlns:a16="http://schemas.microsoft.com/office/drawing/2014/main" id="{FC74CC00-0FC9-9F47-80DD-220CFFFBDC7A}"/>
-              </a:ext>
-            </a:extLst>
-          </p:cNvPr>
-          <p:cNvSpPr/>
-          <p:nvPr/>
-        </p:nvSpPr>
-        <p:spPr>
-          <a:xfrm>
-            <a:off x="984849" y="1738538"/>
-            <a:ext cx="2106591" cy="892629"/>
-          </a:xfrm>
-          <a:prstGeom prst="roundRect">
-            <a:avLst/>
-          </a:prstGeom>
-          <a:solidFill>
-            <a:schemeClr val="accent2">
-              <a:lumMod val="60000"/>
-              <a:lumOff val="40000"/>
-            </a:schemeClr>
-          </a:solidFill>
-        </p:spPr>
-        <p:style>
-          <a:lnRef idx="2">
-            <a:schemeClr val="accent1">
-              <a:shade val="50000"/>
-            </a:schemeClr>
-          </a:lnRef>
-          <a:fillRef idx="1">
-            <a:schemeClr val="accent1"/>
-          </a:fillRef>
-          <a:effectRef idx="0">
-            <a:schemeClr val="accent1"/>
-          </a:effectRef>
-          <a:fontRef idx="minor">
-            <a:schemeClr val="lt1"/>
-          </a:fontRef>
-        </p:style>
-        <p:txBody>
-          <a:bodyPr rtlCol="0" anchor="ctr"/>
-          <a:lstStyle/>
-          <a:p>
-            <a:pPr algn="ctr"/>
-            <a:r>
-              <a:rPr lang="de-DE" dirty="0" err="1"/>
-              <a:t>WebServer</a:t>
-            </a:r>
-            <a:endParaRPr lang="de-DE" dirty="0"/>
-          </a:p>
-        </p:txBody>
-      </p:sp>
-      <p:cxnSp>
-        <p:nvCxnSpPr>
-          <p:cNvPr id="44" name="Gerade Verbindung mit Pfeil 43">
-            <a:extLst>
-              <a:ext uri="{FF2B5EF4-FFF2-40B4-BE49-F238E27FC236}">
-                <a16:creationId xmlns:a16="http://schemas.microsoft.com/office/drawing/2014/main" id="{30CB8BCD-2332-9548-902D-CFD0570A4897}"/>
-              </a:ext>
-            </a:extLst>
-          </p:cNvPr>
-          <p:cNvCxnSpPr>
-            <a:cxnSpLocks/>
-            <a:stCxn id="4" idx="2"/>
-            <a:endCxn id="43" idx="0"/>
-          </p:cNvCxnSpPr>
-          <p:nvPr/>
-        </p:nvCxnSpPr>
-        <p:spPr>
-          <a:xfrm flipH="1">
-            <a:off x="2038145" y="1132114"/>
-            <a:ext cx="3927227" cy="606424"/>
-          </a:xfrm>
-          <a:prstGeom prst="straightConnector1">
-            <a:avLst/>
-          </a:prstGeom>
-          <a:ln w="38100">
-            <a:tailEnd type="triangle"/>
-          </a:ln>
-        </p:spPr>
-        <p:style>
-          <a:lnRef idx="1">
-            <a:schemeClr val="accent1"/>
-          </a:lnRef>
-          <a:fillRef idx="0">
-            <a:schemeClr val="accent1"/>
-          </a:fillRef>
-          <a:effectRef idx="0">
-            <a:schemeClr val="accent1"/>
-          </a:effectRef>
-          <a:fontRef idx="minor">
-            <a:schemeClr val="tx1"/>
-          </a:fontRef>
-        </p:style>
-      </p:cxnSp>
-      <p:sp>
-        <p:nvSpPr>
-          <p:cNvPr id="36" name="Abgerundetes Rechteck 35">
-            <a:extLst>
-              <a:ext uri="{FF2B5EF4-FFF2-40B4-BE49-F238E27FC236}">
-                <a16:creationId xmlns:a16="http://schemas.microsoft.com/office/drawing/2014/main" id="{54D430FF-2891-4B4D-92F9-4E4825667ACF}"/>
-              </a:ext>
-            </a:extLst>
-          </p:cNvPr>
-          <p:cNvSpPr/>
-          <p:nvPr/>
-        </p:nvSpPr>
-        <p:spPr>
-          <a:xfrm>
-            <a:off x="2896098" y="3575210"/>
-            <a:ext cx="2399581" cy="892629"/>
-          </a:xfrm>
-          <a:prstGeom prst="roundRect">
-            <a:avLst/>
-          </a:prstGeom>
-          <a:solidFill>
-            <a:schemeClr val="accent2">
-              <a:lumMod val="60000"/>
-              <a:lumOff val="40000"/>
-            </a:schemeClr>
-          </a:solidFill>
-        </p:spPr>
-        <p:style>
-          <a:lnRef idx="2">
-            <a:schemeClr val="accent1">
-              <a:shade val="50000"/>
-            </a:schemeClr>
-          </a:lnRef>
-          <a:fillRef idx="1">
-            <a:schemeClr val="accent1"/>
-          </a:fillRef>
-          <a:effectRef idx="0">
-            <a:schemeClr val="accent1"/>
-          </a:effectRef>
-          <a:fontRef idx="minor">
-            <a:schemeClr val="lt1"/>
-          </a:fontRef>
-        </p:style>
-        <p:txBody>
-          <a:bodyPr rtlCol="0" anchor="ctr"/>
-          <a:lstStyle/>
-          <a:p>
-            <a:pPr algn="ctr"/>
-            <a:r>
-              <a:rPr lang="de-DE" dirty="0" err="1"/>
-              <a:t>MicroService</a:t>
-            </a:r>
-            <a:br>
-              <a:rPr lang="de-DE" dirty="0"/>
-            </a:br>
-            <a:r>
-              <a:rPr lang="de-DE" dirty="0" err="1"/>
-              <a:t>person</a:t>
-            </a:r>
-            <a:endParaRPr lang="de-DE" dirty="0"/>
-          </a:p>
-        </p:txBody>
-      </p:sp>
-      <p:sp>
-        <p:nvSpPr>
-          <p:cNvPr id="45" name="Magnetplattenspeicher 44">
-            <a:extLst>
-              <a:ext uri="{FF2B5EF4-FFF2-40B4-BE49-F238E27FC236}">
-                <a16:creationId xmlns:a16="http://schemas.microsoft.com/office/drawing/2014/main" id="{B014ABC0-DA58-B548-9464-5CEC15ECA332}"/>
-              </a:ext>
-            </a:extLst>
-          </p:cNvPr>
-          <p:cNvSpPr/>
-          <p:nvPr/>
-        </p:nvSpPr>
-        <p:spPr>
-          <a:xfrm>
-            <a:off x="5015442" y="5002225"/>
-            <a:ext cx="649514" cy="702128"/>
-          </a:xfrm>
-          <a:prstGeom prst="flowChartMagneticDisk">
-            <a:avLst/>
-          </a:prstGeom>
-        </p:spPr>
-        <p:style>
-          <a:lnRef idx="2">
-            <a:schemeClr val="accent1">
-              <a:shade val="50000"/>
-            </a:schemeClr>
-          </a:lnRef>
-          <a:fillRef idx="1">
-            <a:schemeClr val="accent1"/>
-          </a:fillRef>
-          <a:effectRef idx="0">
-            <a:schemeClr val="accent1"/>
-          </a:effectRef>
-          <a:fontRef idx="minor">
-            <a:schemeClr val="lt1"/>
-          </a:fontRef>
-        </p:style>
-        <p:txBody>
-          <a:bodyPr rtlCol="0" anchor="ctr"/>
-          <a:lstStyle/>
-          <a:p>
-            <a:pPr algn="ctr"/>
-            <a:endParaRPr lang="de-DE"/>
-          </a:p>
-        </p:txBody>
-      </p:sp>
-      <p:sp>
-        <p:nvSpPr>
-          <p:cNvPr id="62" name="Abgerundetes Rechteck 61">
-            <a:extLst>
-              <a:ext uri="{FF2B5EF4-FFF2-40B4-BE49-F238E27FC236}">
-                <a16:creationId xmlns:a16="http://schemas.microsoft.com/office/drawing/2014/main" id="{CC6DBFE9-F260-864A-832C-FC081522D987}"/>
-              </a:ext>
-            </a:extLst>
-          </p:cNvPr>
-          <p:cNvSpPr/>
-          <p:nvPr/>
-        </p:nvSpPr>
-        <p:spPr>
-          <a:xfrm>
-            <a:off x="6396350" y="3523796"/>
-            <a:ext cx="2399581" cy="892629"/>
-          </a:xfrm>
-          <a:prstGeom prst="roundRect">
-            <a:avLst/>
-          </a:prstGeom>
-          <a:solidFill>
-            <a:schemeClr val="accent2">
-              <a:lumMod val="60000"/>
-              <a:lumOff val="40000"/>
-            </a:schemeClr>
-          </a:solidFill>
-        </p:spPr>
-        <p:style>
-          <a:lnRef idx="2">
-            <a:schemeClr val="accent1">
-              <a:shade val="50000"/>
-            </a:schemeClr>
-          </a:lnRef>
-          <a:fillRef idx="1">
-            <a:schemeClr val="accent1"/>
-          </a:fillRef>
-          <a:effectRef idx="0">
-            <a:schemeClr val="accent1"/>
-          </a:effectRef>
-          <a:fontRef idx="minor">
-            <a:schemeClr val="lt1"/>
-          </a:fontRef>
-        </p:style>
-        <p:txBody>
-          <a:bodyPr rtlCol="0" anchor="ctr"/>
-          <a:lstStyle/>
-          <a:p>
-            <a:pPr algn="ctr"/>
-            <a:r>
-              <a:rPr lang="de-DE" dirty="0" err="1"/>
-              <a:t>MicroService</a:t>
-            </a:r>
-            <a:br>
-              <a:rPr lang="de-DE" dirty="0"/>
-            </a:br>
-            <a:r>
-              <a:rPr lang="de-DE" dirty="0" err="1"/>
-              <a:t>auftrag</a:t>
-            </a:r>
-            <a:endParaRPr lang="de-DE" dirty="0"/>
-          </a:p>
-        </p:txBody>
-      </p:sp>
-      <p:cxnSp>
-        <p:nvCxnSpPr>
-          <p:cNvPr id="63" name="Gerade Verbindung mit Pfeil 62">
-            <a:extLst>
-              <a:ext uri="{FF2B5EF4-FFF2-40B4-BE49-F238E27FC236}">
-                <a16:creationId xmlns:a16="http://schemas.microsoft.com/office/drawing/2014/main" id="{EF77C060-69E3-224E-952B-B54E2A6A27D9}"/>
-              </a:ext>
-            </a:extLst>
-          </p:cNvPr>
-          <p:cNvCxnSpPr>
-            <a:cxnSpLocks/>
-            <a:stCxn id="5" idx="2"/>
-            <a:endCxn id="62" idx="0"/>
-          </p:cNvCxnSpPr>
-          <p:nvPr/>
-        </p:nvCxnSpPr>
-        <p:spPr>
-          <a:xfrm>
-            <a:off x="5900965" y="2782284"/>
-            <a:ext cx="1695176" cy="741512"/>
-          </a:xfrm>
-          <a:prstGeom prst="straightConnector1">
-            <a:avLst/>
-          </a:prstGeom>
-          <a:ln w="38100">
-            <a:tailEnd type="triangle"/>
-          </a:ln>
-        </p:spPr>
-        <p:style>
-          <a:lnRef idx="1">
-            <a:schemeClr val="accent1"/>
-          </a:lnRef>
-          <a:fillRef idx="0">
-            <a:schemeClr val="accent1"/>
-          </a:fillRef>
-          <a:effectRef idx="0">
-            <a:schemeClr val="accent1"/>
-          </a:effectRef>
-          <a:fontRef idx="minor">
-            <a:schemeClr val="tx1"/>
-          </a:fontRef>
-        </p:style>
-      </p:cxnSp>
-      <p:cxnSp>
-        <p:nvCxnSpPr>
-          <p:cNvPr id="67" name="Gerade Verbindung mit Pfeil 66">
-            <a:extLst>
-              <a:ext uri="{FF2B5EF4-FFF2-40B4-BE49-F238E27FC236}">
-                <a16:creationId xmlns:a16="http://schemas.microsoft.com/office/drawing/2014/main" id="{0C5BEB8E-92C2-E341-BC63-5A4A0C09CCE9}"/>
-              </a:ext>
-            </a:extLst>
-          </p:cNvPr>
-          <p:cNvCxnSpPr>
-            <a:cxnSpLocks/>
-            <a:stCxn id="62" idx="2"/>
-            <a:endCxn id="28" idx="1"/>
-          </p:cNvCxnSpPr>
-          <p:nvPr/>
-        </p:nvCxnSpPr>
-        <p:spPr>
-          <a:xfrm>
-            <a:off x="7596141" y="4416425"/>
-            <a:ext cx="1012645" cy="271391"/>
-          </a:xfrm>
-          <a:prstGeom prst="straightConnector1">
-            <a:avLst/>
-          </a:prstGeom>
-          <a:ln w="38100">
-            <a:tailEnd type="triangle"/>
-          </a:ln>
-        </p:spPr>
-        <p:style>
-          <a:lnRef idx="1">
-            <a:schemeClr val="accent1"/>
-          </a:lnRef>
-          <a:fillRef idx="0">
-            <a:schemeClr val="accent1"/>
-          </a:fillRef>
-          <a:effectRef idx="0">
-            <a:schemeClr val="accent1"/>
-          </a:effectRef>
-          <a:fontRef idx="minor">
-            <a:schemeClr val="tx1"/>
-          </a:fontRef>
-        </p:style>
-      </p:cxnSp>
-      <p:sp>
-        <p:nvSpPr>
-          <p:cNvPr id="2" name="Oval 1">
-            <a:extLst>
-              <a:ext uri="{FF2B5EF4-FFF2-40B4-BE49-F238E27FC236}">
-                <a16:creationId xmlns:a16="http://schemas.microsoft.com/office/drawing/2014/main" id="{D567266D-5A62-92D5-C261-EC3E38B2E50D}"/>
-              </a:ext>
-            </a:extLst>
-          </p:cNvPr>
-          <p:cNvSpPr/>
-          <p:nvPr/>
-        </p:nvSpPr>
-        <p:spPr>
-          <a:xfrm rot="1499831">
-            <a:off x="3844422" y="4390355"/>
-            <a:ext cx="1707292" cy="702127"/>
-          </a:xfrm>
-          <a:prstGeom prst="ellipse">
-            <a:avLst/>
-          </a:prstGeom>
-          <a:solidFill>
-            <a:srgbClr val="FF0000">
-              <a:alpha val="21000"/>
-            </a:srgbClr>
-          </a:solidFill>
-        </p:spPr>
-        <p:style>
-          <a:lnRef idx="2">
-            <a:schemeClr val="accent1">
-              <a:shade val="50000"/>
-            </a:schemeClr>
-          </a:lnRef>
-          <a:fillRef idx="1">
-            <a:schemeClr val="accent1"/>
-          </a:fillRef>
-          <a:effectRef idx="0">
-            <a:schemeClr val="accent1"/>
-          </a:effectRef>
-          <a:fontRef idx="minor">
-            <a:schemeClr val="lt1"/>
-          </a:fontRef>
-        </p:style>
-        <p:txBody>
-          <a:bodyPr rtlCol="0" anchor="ctr"/>
-          <a:lstStyle/>
-          <a:p>
-            <a:pPr algn="ctr"/>
-            <a:endParaRPr lang="de-DE"/>
-          </a:p>
-        </p:txBody>
-      </p:sp>
-    </p:spTree>
-    <p:extLst>
-      <p:ext uri="{BB962C8B-B14F-4D97-AF65-F5344CB8AC3E}">
-        <p14:creationId xmlns:p14="http://schemas.microsoft.com/office/powerpoint/2010/main" val="1354659971"/>
-      </p:ext>
-    </p:extLst>
-  </p:cSld>
-  <p:clrMapOvr>
-    <a:masterClrMapping/>
-  </p:clrMapOvr>
-</p:sld>
-</file>
-
-<file path=ppt/slides/slide7.xml><?xml version="1.0" encoding="utf-8"?>
-<p:sld xmlns:a="http://schemas.openxmlformats.org/drawingml/2006/main" xmlns:r="http://schemas.openxmlformats.org/officeDocument/2006/relationships" xmlns:p="http://schemas.openxmlformats.org/presentationml/2006/main">
-  <p:cSld>
-    <p:spTree>
-      <p:nvGrpSpPr>
-        <p:cNvPr id="1" name=""/>
-        <p:cNvGrpSpPr/>
-        <p:nvPr/>
-      </p:nvGrpSpPr>
-      <p:grpSpPr>
-        <a:xfrm>
-          <a:off x="0" y="0"/>
-          <a:ext cx="0" cy="0"/>
-          <a:chOff x="0" y="0"/>
-          <a:chExt cx="0" cy="0"/>
-        </a:xfrm>
-      </p:grpSpPr>
-      <p:sp>
-        <p:nvSpPr>
-          <p:cNvPr id="4" name="Abgerundetes Rechteck 3">
-            <a:extLst>
-              <a:ext uri="{FF2B5EF4-FFF2-40B4-BE49-F238E27FC236}">
-                <a16:creationId xmlns:a16="http://schemas.microsoft.com/office/drawing/2014/main" id="{79BC28D4-3EF9-804B-82DA-C260F687E32D}"/>
-              </a:ext>
-            </a:extLst>
-          </p:cNvPr>
-          <p:cNvSpPr/>
-          <p:nvPr/>
-        </p:nvSpPr>
-        <p:spPr>
-          <a:xfrm>
-            <a:off x="3646715" y="337456"/>
-            <a:ext cx="4637314" cy="794658"/>
-          </a:xfrm>
-          <a:prstGeom prst="roundRect">
-            <a:avLst/>
-          </a:prstGeom>
-        </p:spPr>
-        <p:style>
-          <a:lnRef idx="2">
-            <a:schemeClr val="accent1">
-              <a:shade val="50000"/>
-            </a:schemeClr>
-          </a:lnRef>
-          <a:fillRef idx="1">
-            <a:schemeClr val="accent1"/>
-          </a:fillRef>
-          <a:effectRef idx="0">
-            <a:schemeClr val="accent1"/>
-          </a:effectRef>
-          <a:fontRef idx="minor">
-            <a:schemeClr val="lt1"/>
-          </a:fontRef>
-        </p:style>
-        <p:txBody>
-          <a:bodyPr rtlCol="0" anchor="ctr"/>
-          <a:lstStyle/>
-          <a:p>
-            <a:pPr algn="ctr"/>
-            <a:r>
-              <a:rPr lang="de-DE" dirty="0"/>
-              <a:t>Browser</a:t>
-            </a:r>
-            <a:br>
-              <a:rPr lang="de-DE" dirty="0"/>
-            </a:br>
-            <a:r>
-              <a:rPr lang="de-DE" dirty="0"/>
-              <a:t>HTML</a:t>
-            </a:r>
-          </a:p>
-        </p:txBody>
-      </p:sp>
-      <p:sp>
-        <p:nvSpPr>
-          <p:cNvPr id="5" name="Abgerundetes Rechteck 4">
-            <a:extLst>
-              <a:ext uri="{FF2B5EF4-FFF2-40B4-BE49-F238E27FC236}">
-                <a16:creationId xmlns:a16="http://schemas.microsoft.com/office/drawing/2014/main" id="{C9E7511D-A024-5043-B96A-C26F19AAB85E}"/>
-              </a:ext>
-            </a:extLst>
-          </p:cNvPr>
-          <p:cNvSpPr/>
-          <p:nvPr/>
-        </p:nvSpPr>
-        <p:spPr>
-          <a:xfrm>
-            <a:off x="4597879" y="1889655"/>
-            <a:ext cx="2606171" cy="892629"/>
-          </a:xfrm>
-          <a:prstGeom prst="roundRect">
-            <a:avLst/>
-          </a:prstGeom>
-          <a:solidFill>
-            <a:schemeClr val="accent2">
-              <a:lumMod val="60000"/>
-              <a:lumOff val="40000"/>
-            </a:schemeClr>
-          </a:solidFill>
-        </p:spPr>
-        <p:style>
-          <a:lnRef idx="2">
-            <a:schemeClr val="accent1">
-              <a:shade val="50000"/>
-            </a:schemeClr>
-          </a:lnRef>
-          <a:fillRef idx="1">
-            <a:schemeClr val="accent1"/>
-          </a:fillRef>
-          <a:effectRef idx="0">
-            <a:schemeClr val="accent1"/>
-          </a:effectRef>
-          <a:fontRef idx="minor">
-            <a:schemeClr val="lt1"/>
-          </a:fontRef>
-        </p:style>
-        <p:txBody>
-          <a:bodyPr rtlCol="0" anchor="ctr"/>
-          <a:lstStyle/>
-          <a:p>
-            <a:pPr algn="ctr"/>
-            <a:r>
-              <a:rPr lang="de-DE" dirty="0" err="1"/>
-              <a:t>MicroService</a:t>
-            </a:r>
-            <a:br>
-              <a:rPr lang="de-DE" dirty="0"/>
-            </a:br>
-            <a:r>
-              <a:rPr lang="de-DE" dirty="0" err="1"/>
-              <a:t>shop</a:t>
-            </a:r>
-            <a:endParaRPr lang="de-DE" dirty="0"/>
-          </a:p>
-        </p:txBody>
-      </p:sp>
-      <p:cxnSp>
-        <p:nvCxnSpPr>
-          <p:cNvPr id="7" name="Gerade Verbindung mit Pfeil 6">
-            <a:extLst>
-              <a:ext uri="{FF2B5EF4-FFF2-40B4-BE49-F238E27FC236}">
-                <a16:creationId xmlns:a16="http://schemas.microsoft.com/office/drawing/2014/main" id="{7EA12433-B077-C346-B199-60BE14EA375F}"/>
-              </a:ext>
-            </a:extLst>
-          </p:cNvPr>
-          <p:cNvCxnSpPr>
-            <a:cxnSpLocks/>
-            <a:stCxn id="4" idx="2"/>
-            <a:endCxn id="5" idx="0"/>
-          </p:cNvCxnSpPr>
-          <p:nvPr/>
-        </p:nvCxnSpPr>
-        <p:spPr>
-          <a:xfrm flipH="1">
-            <a:off x="5900965" y="1132114"/>
-            <a:ext cx="64407" cy="757541"/>
-          </a:xfrm>
-          <a:prstGeom prst="straightConnector1">
-            <a:avLst/>
-          </a:prstGeom>
-          <a:ln w="38100">
-            <a:tailEnd type="triangle"/>
-          </a:ln>
-        </p:spPr>
-        <p:style>
-          <a:lnRef idx="1">
-            <a:schemeClr val="accent1"/>
-          </a:lnRef>
-          <a:fillRef idx="0">
-            <a:schemeClr val="accent1"/>
-          </a:fillRef>
-          <a:effectRef idx="0">
-            <a:schemeClr val="accent1"/>
-          </a:effectRef>
-          <a:fontRef idx="minor">
-            <a:schemeClr val="tx1"/>
-          </a:fontRef>
-        </p:style>
-      </p:cxnSp>
-      <p:cxnSp>
-        <p:nvCxnSpPr>
-          <p:cNvPr id="13" name="Gerade Verbindung mit Pfeil 12">
-            <a:extLst>
-              <a:ext uri="{FF2B5EF4-FFF2-40B4-BE49-F238E27FC236}">
-                <a16:creationId xmlns:a16="http://schemas.microsoft.com/office/drawing/2014/main" id="{38590E46-A719-2441-90F2-D877DA52215C}"/>
-              </a:ext>
-            </a:extLst>
-          </p:cNvPr>
-          <p:cNvCxnSpPr>
-            <a:cxnSpLocks/>
-            <a:stCxn id="5" idx="2"/>
-            <a:endCxn id="36" idx="0"/>
-          </p:cNvCxnSpPr>
-          <p:nvPr/>
-        </p:nvCxnSpPr>
-        <p:spPr>
-          <a:xfrm flipH="1">
-            <a:off x="4095889" y="2782284"/>
-            <a:ext cx="1805076" cy="792926"/>
-          </a:xfrm>
-          <a:prstGeom prst="straightConnector1">
-            <a:avLst/>
-          </a:prstGeom>
-          <a:ln w="38100">
-            <a:tailEnd type="triangle"/>
-          </a:ln>
-        </p:spPr>
-        <p:style>
-          <a:lnRef idx="1">
-            <a:schemeClr val="accent1"/>
-          </a:lnRef>
-          <a:fillRef idx="0">
-            <a:schemeClr val="accent1"/>
-          </a:fillRef>
-          <a:effectRef idx="0">
-            <a:schemeClr val="accent1"/>
-          </a:effectRef>
-          <a:fontRef idx="minor">
-            <a:schemeClr val="tx1"/>
-          </a:fontRef>
-        </p:style>
-      </p:cxnSp>
-      <p:sp>
-        <p:nvSpPr>
-          <p:cNvPr id="28" name="Magnetplattenspeicher 27">
-            <a:extLst>
-              <a:ext uri="{FF2B5EF4-FFF2-40B4-BE49-F238E27FC236}">
-                <a16:creationId xmlns:a16="http://schemas.microsoft.com/office/drawing/2014/main" id="{9343B73B-6448-4443-B86D-6669D318D430}"/>
-              </a:ext>
-            </a:extLst>
-          </p:cNvPr>
-          <p:cNvSpPr/>
-          <p:nvPr/>
-        </p:nvSpPr>
-        <p:spPr>
-          <a:xfrm>
-            <a:off x="8284029" y="4687816"/>
-            <a:ext cx="649514" cy="702128"/>
-          </a:xfrm>
-          <a:prstGeom prst="flowChartMagneticDisk">
-            <a:avLst/>
-          </a:prstGeom>
-        </p:spPr>
-        <p:style>
-          <a:lnRef idx="2">
-            <a:schemeClr val="accent1">
-              <a:shade val="50000"/>
-            </a:schemeClr>
-          </a:lnRef>
-          <a:fillRef idx="1">
-            <a:schemeClr val="accent1"/>
-          </a:fillRef>
-          <a:effectRef idx="0">
-            <a:schemeClr val="accent1"/>
-          </a:effectRef>
-          <a:fontRef idx="minor">
-            <a:schemeClr val="lt1"/>
-          </a:fontRef>
-        </p:style>
-        <p:txBody>
-          <a:bodyPr rtlCol="0" anchor="ctr"/>
-          <a:lstStyle/>
-          <a:p>
-            <a:pPr algn="ctr"/>
-            <a:endParaRPr lang="de-DE"/>
-          </a:p>
-        </p:txBody>
-      </p:sp>
-      <p:cxnSp>
-        <p:nvCxnSpPr>
-          <p:cNvPr id="35" name="Gerade Verbindung mit Pfeil 34">
-            <a:extLst>
-              <a:ext uri="{FF2B5EF4-FFF2-40B4-BE49-F238E27FC236}">
-                <a16:creationId xmlns:a16="http://schemas.microsoft.com/office/drawing/2014/main" id="{F60B072C-6DFB-7542-A5BF-A3FCB3709BF7}"/>
-              </a:ext>
-            </a:extLst>
-          </p:cNvPr>
-          <p:cNvCxnSpPr>
-            <a:cxnSpLocks/>
-            <a:stCxn id="36" idx="2"/>
-            <a:endCxn id="45" idx="1"/>
-          </p:cNvCxnSpPr>
-          <p:nvPr/>
-        </p:nvCxnSpPr>
-        <p:spPr>
-          <a:xfrm>
-            <a:off x="4095889" y="4467839"/>
-            <a:ext cx="1244310" cy="534386"/>
-          </a:xfrm>
-          <a:prstGeom prst="straightConnector1">
-            <a:avLst/>
-          </a:prstGeom>
-          <a:ln w="38100">
-            <a:tailEnd type="triangle"/>
-          </a:ln>
-        </p:spPr>
-        <p:style>
-          <a:lnRef idx="1">
-            <a:schemeClr val="accent1"/>
-          </a:lnRef>
-          <a:fillRef idx="0">
-            <a:schemeClr val="accent1"/>
-          </a:fillRef>
-          <a:effectRef idx="0">
-            <a:schemeClr val="accent1"/>
-          </a:effectRef>
-          <a:fontRef idx="minor">
-            <a:schemeClr val="tx1"/>
-          </a:fontRef>
-        </p:style>
-      </p:cxnSp>
-      <p:sp>
-        <p:nvSpPr>
-          <p:cNvPr id="43" name="Abgerundetes Rechteck 42">
-            <a:extLst>
-              <a:ext uri="{FF2B5EF4-FFF2-40B4-BE49-F238E27FC236}">
-                <a16:creationId xmlns:a16="http://schemas.microsoft.com/office/drawing/2014/main" id="{FC74CC00-0FC9-9F47-80DD-220CFFFBDC7A}"/>
-              </a:ext>
-            </a:extLst>
-          </p:cNvPr>
-          <p:cNvSpPr/>
-          <p:nvPr/>
-        </p:nvSpPr>
-        <p:spPr>
-          <a:xfrm>
-            <a:off x="984849" y="1738538"/>
-            <a:ext cx="2106591" cy="892629"/>
-          </a:xfrm>
-          <a:prstGeom prst="roundRect">
-            <a:avLst/>
-          </a:prstGeom>
-          <a:solidFill>
-            <a:schemeClr val="accent2">
-              <a:lumMod val="60000"/>
-              <a:lumOff val="40000"/>
-            </a:schemeClr>
-          </a:solidFill>
-        </p:spPr>
-        <p:style>
-          <a:lnRef idx="2">
-            <a:schemeClr val="accent1">
-              <a:shade val="50000"/>
-            </a:schemeClr>
-          </a:lnRef>
-          <a:fillRef idx="1">
-            <a:schemeClr val="accent1"/>
-          </a:fillRef>
-          <a:effectRef idx="0">
-            <a:schemeClr val="accent1"/>
-          </a:effectRef>
-          <a:fontRef idx="minor">
-            <a:schemeClr val="lt1"/>
-          </a:fontRef>
-        </p:style>
-        <p:txBody>
-          <a:bodyPr rtlCol="0" anchor="ctr"/>
-          <a:lstStyle/>
-          <a:p>
-            <a:pPr algn="ctr"/>
-            <a:r>
-              <a:rPr lang="de-DE" dirty="0" err="1"/>
-              <a:t>WebServer</a:t>
-            </a:r>
-            <a:endParaRPr lang="de-DE" dirty="0"/>
-          </a:p>
-        </p:txBody>
-      </p:sp>
-      <p:cxnSp>
-        <p:nvCxnSpPr>
-          <p:cNvPr id="44" name="Gerade Verbindung mit Pfeil 43">
-            <a:extLst>
-              <a:ext uri="{FF2B5EF4-FFF2-40B4-BE49-F238E27FC236}">
-                <a16:creationId xmlns:a16="http://schemas.microsoft.com/office/drawing/2014/main" id="{30CB8BCD-2332-9548-902D-CFD0570A4897}"/>
-              </a:ext>
-            </a:extLst>
-          </p:cNvPr>
-          <p:cNvCxnSpPr>
-            <a:cxnSpLocks/>
-            <a:stCxn id="4" idx="2"/>
-            <a:endCxn id="43" idx="0"/>
-          </p:cNvCxnSpPr>
-          <p:nvPr/>
-        </p:nvCxnSpPr>
-        <p:spPr>
-          <a:xfrm flipH="1">
-            <a:off x="2038145" y="1132114"/>
-            <a:ext cx="3927227" cy="606424"/>
-          </a:xfrm>
-          <a:prstGeom prst="straightConnector1">
-            <a:avLst/>
-          </a:prstGeom>
-          <a:ln w="38100">
-            <a:tailEnd type="triangle"/>
-          </a:ln>
-        </p:spPr>
-        <p:style>
-          <a:lnRef idx="1">
-            <a:schemeClr val="accent1"/>
-          </a:lnRef>
-          <a:fillRef idx="0">
-            <a:schemeClr val="accent1"/>
-          </a:fillRef>
-          <a:effectRef idx="0">
-            <a:schemeClr val="accent1"/>
-          </a:effectRef>
-          <a:fontRef idx="minor">
-            <a:schemeClr val="tx1"/>
-          </a:fontRef>
-        </p:style>
-      </p:cxnSp>
-      <p:sp>
-        <p:nvSpPr>
-          <p:cNvPr id="36" name="Abgerundetes Rechteck 35">
-            <a:extLst>
-              <a:ext uri="{FF2B5EF4-FFF2-40B4-BE49-F238E27FC236}">
-                <a16:creationId xmlns:a16="http://schemas.microsoft.com/office/drawing/2014/main" id="{54D430FF-2891-4B4D-92F9-4E4825667ACF}"/>
-              </a:ext>
-            </a:extLst>
-          </p:cNvPr>
-          <p:cNvSpPr/>
-          <p:nvPr/>
-        </p:nvSpPr>
-        <p:spPr>
-          <a:xfrm>
-            <a:off x="2896098" y="3575210"/>
-            <a:ext cx="2399581" cy="892629"/>
-          </a:xfrm>
-          <a:prstGeom prst="roundRect">
-            <a:avLst/>
-          </a:prstGeom>
-          <a:solidFill>
-            <a:schemeClr val="accent2">
-              <a:lumMod val="60000"/>
-              <a:lumOff val="40000"/>
-            </a:schemeClr>
-          </a:solidFill>
-        </p:spPr>
-        <p:style>
-          <a:lnRef idx="2">
-            <a:schemeClr val="accent1">
-              <a:shade val="50000"/>
-            </a:schemeClr>
-          </a:lnRef>
-          <a:fillRef idx="1">
-            <a:schemeClr val="accent1"/>
-          </a:fillRef>
-          <a:effectRef idx="0">
-            <a:schemeClr val="accent1"/>
-          </a:effectRef>
-          <a:fontRef idx="minor">
-            <a:schemeClr val="lt1"/>
-          </a:fontRef>
-        </p:style>
-        <p:txBody>
-          <a:bodyPr rtlCol="0" anchor="ctr"/>
-          <a:lstStyle/>
-          <a:p>
-            <a:pPr algn="ctr"/>
-            <a:r>
-              <a:rPr lang="de-DE" dirty="0" err="1"/>
-              <a:t>MicroService</a:t>
-            </a:r>
-            <a:br>
-              <a:rPr lang="de-DE" dirty="0"/>
-            </a:br>
-            <a:r>
-              <a:rPr lang="de-DE" dirty="0" err="1"/>
-              <a:t>person</a:t>
-            </a:r>
-            <a:endParaRPr lang="de-DE" dirty="0"/>
-          </a:p>
-        </p:txBody>
-      </p:sp>
-      <p:sp>
-        <p:nvSpPr>
-          <p:cNvPr id="45" name="Magnetplattenspeicher 44">
-            <a:extLst>
-              <a:ext uri="{FF2B5EF4-FFF2-40B4-BE49-F238E27FC236}">
-                <a16:creationId xmlns:a16="http://schemas.microsoft.com/office/drawing/2014/main" id="{B014ABC0-DA58-B548-9464-5CEC15ECA332}"/>
-              </a:ext>
-            </a:extLst>
-          </p:cNvPr>
-          <p:cNvSpPr/>
-          <p:nvPr/>
-        </p:nvSpPr>
-        <p:spPr>
-          <a:xfrm>
-            <a:off x="5015442" y="5002225"/>
-            <a:ext cx="649514" cy="702128"/>
-          </a:xfrm>
-          <a:prstGeom prst="flowChartMagneticDisk">
-            <a:avLst/>
-          </a:prstGeom>
-        </p:spPr>
-        <p:style>
-          <a:lnRef idx="2">
-            <a:schemeClr val="accent1">
-              <a:shade val="50000"/>
-            </a:schemeClr>
-          </a:lnRef>
-          <a:fillRef idx="1">
-            <a:schemeClr val="accent1"/>
-          </a:fillRef>
-          <a:effectRef idx="0">
-            <a:schemeClr val="accent1"/>
-          </a:effectRef>
-          <a:fontRef idx="minor">
-            <a:schemeClr val="lt1"/>
-          </a:fontRef>
-        </p:style>
-        <p:txBody>
-          <a:bodyPr rtlCol="0" anchor="ctr"/>
-          <a:lstStyle/>
-          <a:p>
-            <a:pPr algn="ctr"/>
-            <a:endParaRPr lang="de-DE"/>
-          </a:p>
-        </p:txBody>
-      </p:sp>
-      <p:sp>
-        <p:nvSpPr>
-          <p:cNvPr id="62" name="Abgerundetes Rechteck 61">
-            <a:extLst>
-              <a:ext uri="{FF2B5EF4-FFF2-40B4-BE49-F238E27FC236}">
-                <a16:creationId xmlns:a16="http://schemas.microsoft.com/office/drawing/2014/main" id="{CC6DBFE9-F260-864A-832C-FC081522D987}"/>
-              </a:ext>
-            </a:extLst>
-          </p:cNvPr>
-          <p:cNvSpPr/>
-          <p:nvPr/>
-        </p:nvSpPr>
-        <p:spPr>
-          <a:xfrm>
-            <a:off x="6396350" y="3523796"/>
-            <a:ext cx="2399581" cy="892629"/>
-          </a:xfrm>
-          <a:prstGeom prst="roundRect">
-            <a:avLst/>
-          </a:prstGeom>
-          <a:solidFill>
-            <a:schemeClr val="accent2">
-              <a:lumMod val="60000"/>
-              <a:lumOff val="40000"/>
-            </a:schemeClr>
-          </a:solidFill>
-        </p:spPr>
-        <p:style>
-          <a:lnRef idx="2">
-            <a:schemeClr val="accent1">
-              <a:shade val="50000"/>
-            </a:schemeClr>
-          </a:lnRef>
-          <a:fillRef idx="1">
-            <a:schemeClr val="accent1"/>
-          </a:fillRef>
-          <a:effectRef idx="0">
-            <a:schemeClr val="accent1"/>
-          </a:effectRef>
-          <a:fontRef idx="minor">
-            <a:schemeClr val="lt1"/>
-          </a:fontRef>
-        </p:style>
-        <p:txBody>
-          <a:bodyPr rtlCol="0" anchor="ctr"/>
-          <a:lstStyle/>
-          <a:p>
-            <a:pPr algn="ctr"/>
-            <a:r>
-              <a:rPr lang="de-DE" dirty="0" err="1"/>
-              <a:t>MicroService</a:t>
-            </a:r>
-            <a:br>
-              <a:rPr lang="de-DE" dirty="0"/>
-            </a:br>
-            <a:r>
-              <a:rPr lang="de-DE" dirty="0" err="1"/>
-              <a:t>auftrag</a:t>
-            </a:r>
-            <a:endParaRPr lang="de-DE" dirty="0"/>
-          </a:p>
-        </p:txBody>
-      </p:sp>
-      <p:cxnSp>
-        <p:nvCxnSpPr>
-          <p:cNvPr id="63" name="Gerade Verbindung mit Pfeil 62">
-            <a:extLst>
-              <a:ext uri="{FF2B5EF4-FFF2-40B4-BE49-F238E27FC236}">
-                <a16:creationId xmlns:a16="http://schemas.microsoft.com/office/drawing/2014/main" id="{EF77C060-69E3-224E-952B-B54E2A6A27D9}"/>
-              </a:ext>
-            </a:extLst>
-          </p:cNvPr>
-          <p:cNvCxnSpPr>
-            <a:cxnSpLocks/>
-            <a:stCxn id="5" idx="2"/>
-            <a:endCxn id="62" idx="0"/>
-          </p:cNvCxnSpPr>
-          <p:nvPr/>
-        </p:nvCxnSpPr>
-        <p:spPr>
-          <a:xfrm>
-            <a:off x="5900965" y="2782284"/>
-            <a:ext cx="1695176" cy="741512"/>
-          </a:xfrm>
-          <a:prstGeom prst="straightConnector1">
-            <a:avLst/>
-          </a:prstGeom>
-          <a:ln w="38100">
-            <a:tailEnd type="triangle"/>
-          </a:ln>
-        </p:spPr>
-        <p:style>
-          <a:lnRef idx="1">
-            <a:schemeClr val="accent1"/>
-          </a:lnRef>
-          <a:fillRef idx="0">
-            <a:schemeClr val="accent1"/>
-          </a:fillRef>
-          <a:effectRef idx="0">
-            <a:schemeClr val="accent1"/>
-          </a:effectRef>
-          <a:fontRef idx="minor">
-            <a:schemeClr val="tx1"/>
-          </a:fontRef>
-        </p:style>
-      </p:cxnSp>
-      <p:cxnSp>
-        <p:nvCxnSpPr>
-          <p:cNvPr id="67" name="Gerade Verbindung mit Pfeil 66">
-            <a:extLst>
-              <a:ext uri="{FF2B5EF4-FFF2-40B4-BE49-F238E27FC236}">
-                <a16:creationId xmlns:a16="http://schemas.microsoft.com/office/drawing/2014/main" id="{0C5BEB8E-92C2-E341-BC63-5A4A0C09CCE9}"/>
-              </a:ext>
-            </a:extLst>
-          </p:cNvPr>
-          <p:cNvCxnSpPr>
-            <a:cxnSpLocks/>
-            <a:stCxn id="62" idx="2"/>
-            <a:endCxn id="28" idx="1"/>
-          </p:cNvCxnSpPr>
-          <p:nvPr/>
-        </p:nvCxnSpPr>
-        <p:spPr>
-          <a:xfrm>
-            <a:off x="7596141" y="4416425"/>
-            <a:ext cx="1012645" cy="271391"/>
-          </a:xfrm>
-          <a:prstGeom prst="straightConnector1">
-            <a:avLst/>
-          </a:prstGeom>
-          <a:ln w="38100">
-            <a:tailEnd type="triangle"/>
-          </a:ln>
-        </p:spPr>
-        <p:style>
-          <a:lnRef idx="1">
-            <a:schemeClr val="accent1"/>
-          </a:lnRef>
-          <a:fillRef idx="0">
-            <a:schemeClr val="accent1"/>
-          </a:fillRef>
-          <a:effectRef idx="0">
-            <a:schemeClr val="accent1"/>
-          </a:effectRef>
-          <a:fontRef idx="minor">
-            <a:schemeClr val="tx1"/>
-          </a:fontRef>
-        </p:style>
-      </p:cxnSp>
-      <p:sp>
-        <p:nvSpPr>
-          <p:cNvPr id="2" name="Oval 1">
-            <a:extLst>
-              <a:ext uri="{FF2B5EF4-FFF2-40B4-BE49-F238E27FC236}">
-                <a16:creationId xmlns:a16="http://schemas.microsoft.com/office/drawing/2014/main" id="{D567266D-5A62-92D5-C261-EC3E38B2E50D}"/>
-              </a:ext>
-            </a:extLst>
-          </p:cNvPr>
-          <p:cNvSpPr/>
-          <p:nvPr/>
-        </p:nvSpPr>
-        <p:spPr>
-          <a:xfrm rot="20214424">
-            <a:off x="3883487" y="2806231"/>
-            <a:ext cx="2185484" cy="702127"/>
-          </a:xfrm>
-          <a:prstGeom prst="ellipse">
-            <a:avLst/>
-          </a:prstGeom>
-          <a:solidFill>
-            <a:srgbClr val="FF0000">
-              <a:alpha val="21000"/>
-            </a:srgbClr>
-          </a:solidFill>
-        </p:spPr>
-        <p:style>
-          <a:lnRef idx="2">
-            <a:schemeClr val="accent1">
-              <a:shade val="50000"/>
-            </a:schemeClr>
-          </a:lnRef>
-          <a:fillRef idx="1">
-            <a:schemeClr val="accent1"/>
-          </a:fillRef>
-          <a:effectRef idx="0">
-            <a:schemeClr val="accent1"/>
-          </a:effectRef>
-          <a:fontRef idx="minor">
-            <a:schemeClr val="lt1"/>
-          </a:fontRef>
-        </p:style>
-        <p:txBody>
-          <a:bodyPr rtlCol="0" anchor="ctr"/>
-          <a:lstStyle/>
-          <a:p>
-            <a:pPr algn="ctr"/>
-            <a:endParaRPr lang="de-DE"/>
-          </a:p>
-        </p:txBody>
-      </p:sp>
-      <p:sp>
-        <p:nvSpPr>
-          <p:cNvPr id="3" name="Oval 2">
-            <a:extLst>
-              <a:ext uri="{FF2B5EF4-FFF2-40B4-BE49-F238E27FC236}">
-                <a16:creationId xmlns:a16="http://schemas.microsoft.com/office/drawing/2014/main" id="{79FCD0E9-1838-80FA-98C7-43D4D18FAF56}"/>
-              </a:ext>
-            </a:extLst>
-          </p:cNvPr>
-          <p:cNvSpPr/>
-          <p:nvPr/>
-        </p:nvSpPr>
-        <p:spPr>
-          <a:xfrm>
-            <a:off x="3719524" y="3374441"/>
-            <a:ext cx="878355" cy="376465"/>
-          </a:xfrm>
-          <a:prstGeom prst="ellipse">
-            <a:avLst/>
-          </a:prstGeom>
-          <a:solidFill>
-            <a:srgbClr val="00B050">
-              <a:alpha val="21000"/>
-            </a:srgbClr>
-          </a:solidFill>
-        </p:spPr>
-        <p:style>
-          <a:lnRef idx="2">
-            <a:schemeClr val="accent1">
-              <a:shade val="50000"/>
-            </a:schemeClr>
-          </a:lnRef>
-          <a:fillRef idx="1">
-            <a:schemeClr val="accent1"/>
-          </a:fillRef>
-          <a:effectRef idx="0">
-            <a:schemeClr val="accent1"/>
-          </a:effectRef>
-          <a:fontRef idx="minor">
-            <a:schemeClr val="lt1"/>
-          </a:fontRef>
-        </p:style>
-        <p:txBody>
-          <a:bodyPr rtlCol="0" anchor="ctr"/>
-          <a:lstStyle/>
-          <a:p>
-            <a:pPr algn="ctr"/>
-            <a:endParaRPr lang="de-DE"/>
-          </a:p>
-        </p:txBody>
-      </p:sp>
-      <p:sp>
-        <p:nvSpPr>
-          <p:cNvPr id="17" name="Oval 16">
-            <a:extLst>
-              <a:ext uri="{FF2B5EF4-FFF2-40B4-BE49-F238E27FC236}">
-                <a16:creationId xmlns:a16="http://schemas.microsoft.com/office/drawing/2014/main" id="{420C7665-1CF2-D594-4145-47CDDECE069D}"/>
-              </a:ext>
-            </a:extLst>
-          </p:cNvPr>
-          <p:cNvSpPr/>
-          <p:nvPr/>
-        </p:nvSpPr>
-        <p:spPr>
-          <a:xfrm>
-            <a:off x="5240914" y="2594051"/>
-            <a:ext cx="878355" cy="376465"/>
-          </a:xfrm>
-          <a:prstGeom prst="ellipse">
-            <a:avLst/>
-          </a:prstGeom>
-          <a:solidFill>
-            <a:srgbClr val="00B050">
-              <a:alpha val="21000"/>
-            </a:srgbClr>
-          </a:solidFill>
-        </p:spPr>
-        <p:style>
-          <a:lnRef idx="2">
-            <a:schemeClr val="accent1">
-              <a:shade val="50000"/>
-            </a:schemeClr>
-          </a:lnRef>
-          <a:fillRef idx="1">
-            <a:schemeClr val="accent1"/>
-          </a:fillRef>
-          <a:effectRef idx="0">
-            <a:schemeClr val="accent1"/>
-          </a:effectRef>
-          <a:fontRef idx="minor">
-            <a:schemeClr val="lt1"/>
-          </a:fontRef>
-        </p:style>
-        <p:txBody>
-          <a:bodyPr rtlCol="0" anchor="ctr"/>
-          <a:lstStyle/>
-          <a:p>
-            <a:pPr algn="ctr"/>
-            <a:endParaRPr lang="de-DE"/>
-          </a:p>
-        </p:txBody>
-      </p:sp>
-      <p:sp>
-        <p:nvSpPr>
-          <p:cNvPr id="6" name="Textfeld 5">
-            <a:extLst>
-              <a:ext uri="{FF2B5EF4-FFF2-40B4-BE49-F238E27FC236}">
-                <a16:creationId xmlns:a16="http://schemas.microsoft.com/office/drawing/2014/main" id="{1070CF0C-4663-C1F1-379B-2F3D386B19AB}"/>
-              </a:ext>
-            </a:extLst>
-          </p:cNvPr>
-          <p:cNvSpPr txBox="1"/>
-          <p:nvPr/>
-        </p:nvSpPr>
-        <p:spPr>
-          <a:xfrm>
-            <a:off x="5038234" y="2772630"/>
-            <a:ext cx="1189941" cy="369332"/>
-          </a:xfrm>
-          <a:prstGeom prst="rect">
-            <a:avLst/>
-          </a:prstGeom>
-          <a:noFill/>
-        </p:spPr>
-        <p:txBody>
-          <a:bodyPr wrap="none" rtlCol="0">
-            <a:spAutoFit/>
-          </a:bodyPr>
-          <a:lstStyle/>
-          <a:p>
-            <a:r>
-              <a:rPr lang="de-DE" dirty="0"/>
-              <a:t>Rest-Client</a:t>
-            </a:r>
-          </a:p>
-        </p:txBody>
-      </p:sp>
-      <p:sp>
-        <p:nvSpPr>
-          <p:cNvPr id="19" name="Textfeld 18">
-            <a:extLst>
-              <a:ext uri="{FF2B5EF4-FFF2-40B4-BE49-F238E27FC236}">
-                <a16:creationId xmlns:a16="http://schemas.microsoft.com/office/drawing/2014/main" id="{16E86808-8693-0A1C-D298-8C1FFB7CB7FB}"/>
-              </a:ext>
-            </a:extLst>
-          </p:cNvPr>
-          <p:cNvSpPr txBox="1"/>
-          <p:nvPr/>
-        </p:nvSpPr>
-        <p:spPr>
-          <a:xfrm>
-            <a:off x="3299128" y="3101838"/>
-            <a:ext cx="1590179" cy="369332"/>
-          </a:xfrm>
-          <a:prstGeom prst="rect">
-            <a:avLst/>
-          </a:prstGeom>
-          <a:noFill/>
-        </p:spPr>
-        <p:txBody>
-          <a:bodyPr wrap="none" rtlCol="0">
-            <a:spAutoFit/>
-          </a:bodyPr>
-          <a:lstStyle/>
-          <a:p>
-            <a:r>
-              <a:rPr lang="de-DE" dirty="0"/>
-              <a:t>Rest-Controller</a:t>
-            </a:r>
-          </a:p>
-        </p:txBody>
-      </p:sp>
-    </p:spTree>
-    <p:extLst>
-      <p:ext uri="{BB962C8B-B14F-4D97-AF65-F5344CB8AC3E}">
-        <p14:creationId xmlns:p14="http://schemas.microsoft.com/office/powerpoint/2010/main" val="2507085268"/>
       </p:ext>
     </p:extLst>
   </p:cSld>

</xml_diff>